<commit_message>
Corrected PowerPoint to match the new Insight and Recommendations
</commit_message>
<xml_diff>
--- a/executive_presentation.pptx
+++ b/executive_presentation.pptx
@@ -45,7 +45,7 @@
         <a:uFillTx/>
       </a:defRPr>
     </a:defPPr>
-    <a:lvl1pPr marL="0" marR="0" indent="0" algn="l" defTabSz="2438338" rtl="0" fontAlgn="auto" latinLnBrk="0" hangingPunct="0">
+    <a:lvl1pPr marL="0" marR="0" indent="0" algn="l" defTabSz="2438337" rtl="0" fontAlgn="auto" latinLnBrk="0" hangingPunct="0">
       <a:lnSpc>
         <a:spcPct val="100000"/>
       </a:lnSpc>
@@ -65,17 +65,17 @@
           <a:noFill/>
         </a:ln>
         <a:solidFill>
-          <a:srgbClr val="FFFFFF"/>
+          <a:srgbClr val="4B6079"/>
         </a:solidFill>
         <a:effectLst/>
         <a:uFillTx/>
-        <a:latin typeface="Graphik Light"/>
-        <a:ea typeface="Graphik Light"/>
-        <a:cs typeface="Graphik Light"/>
-        <a:sym typeface="Graphik Light"/>
+        <a:latin typeface="Produkt Extralight"/>
+        <a:ea typeface="Produkt Extralight"/>
+        <a:cs typeface="Produkt Extralight"/>
+        <a:sym typeface="Produkt Extralight"/>
       </a:defRPr>
     </a:lvl1pPr>
-    <a:lvl2pPr marL="0" marR="0" indent="457200" algn="l" defTabSz="2438338" rtl="0" fontAlgn="auto" latinLnBrk="0" hangingPunct="0">
+    <a:lvl2pPr marL="0" marR="0" indent="0" algn="l" defTabSz="2438337" rtl="0" fontAlgn="auto" latinLnBrk="0" hangingPunct="0">
       <a:lnSpc>
         <a:spcPct val="100000"/>
       </a:lnSpc>
@@ -95,17 +95,17 @@
           <a:noFill/>
         </a:ln>
         <a:solidFill>
-          <a:srgbClr val="FFFFFF"/>
+          <a:srgbClr val="4B6079"/>
         </a:solidFill>
         <a:effectLst/>
         <a:uFillTx/>
-        <a:latin typeface="Graphik Light"/>
-        <a:ea typeface="Graphik Light"/>
-        <a:cs typeface="Graphik Light"/>
-        <a:sym typeface="Graphik Light"/>
+        <a:latin typeface="Produkt Extralight"/>
+        <a:ea typeface="Produkt Extralight"/>
+        <a:cs typeface="Produkt Extralight"/>
+        <a:sym typeface="Produkt Extralight"/>
       </a:defRPr>
     </a:lvl2pPr>
-    <a:lvl3pPr marL="0" marR="0" indent="914400" algn="l" defTabSz="2438338" rtl="0" fontAlgn="auto" latinLnBrk="0" hangingPunct="0">
+    <a:lvl3pPr marL="0" marR="0" indent="0" algn="l" defTabSz="2438337" rtl="0" fontAlgn="auto" latinLnBrk="0" hangingPunct="0">
       <a:lnSpc>
         <a:spcPct val="100000"/>
       </a:lnSpc>
@@ -125,17 +125,17 @@
           <a:noFill/>
         </a:ln>
         <a:solidFill>
-          <a:srgbClr val="FFFFFF"/>
+          <a:srgbClr val="4B6079"/>
         </a:solidFill>
         <a:effectLst/>
         <a:uFillTx/>
-        <a:latin typeface="Graphik Light"/>
-        <a:ea typeface="Graphik Light"/>
-        <a:cs typeface="Graphik Light"/>
-        <a:sym typeface="Graphik Light"/>
+        <a:latin typeface="Produkt Extralight"/>
+        <a:ea typeface="Produkt Extralight"/>
+        <a:cs typeface="Produkt Extralight"/>
+        <a:sym typeface="Produkt Extralight"/>
       </a:defRPr>
     </a:lvl3pPr>
-    <a:lvl4pPr marL="0" marR="0" indent="1371600" algn="l" defTabSz="2438338" rtl="0" fontAlgn="auto" latinLnBrk="0" hangingPunct="0">
+    <a:lvl4pPr marL="0" marR="0" indent="0" algn="l" defTabSz="2438337" rtl="0" fontAlgn="auto" latinLnBrk="0" hangingPunct="0">
       <a:lnSpc>
         <a:spcPct val="100000"/>
       </a:lnSpc>
@@ -155,17 +155,17 @@
           <a:noFill/>
         </a:ln>
         <a:solidFill>
-          <a:srgbClr val="FFFFFF"/>
+          <a:srgbClr val="4B6079"/>
         </a:solidFill>
         <a:effectLst/>
         <a:uFillTx/>
-        <a:latin typeface="Graphik Light"/>
-        <a:ea typeface="Graphik Light"/>
-        <a:cs typeface="Graphik Light"/>
-        <a:sym typeface="Graphik Light"/>
+        <a:latin typeface="Produkt Extralight"/>
+        <a:ea typeface="Produkt Extralight"/>
+        <a:cs typeface="Produkt Extralight"/>
+        <a:sym typeface="Produkt Extralight"/>
       </a:defRPr>
     </a:lvl4pPr>
-    <a:lvl5pPr marL="0" marR="0" indent="1828800" algn="l" defTabSz="2438338" rtl="0" fontAlgn="auto" latinLnBrk="0" hangingPunct="0">
+    <a:lvl5pPr marL="0" marR="0" indent="0" algn="l" defTabSz="2438337" rtl="0" fontAlgn="auto" latinLnBrk="0" hangingPunct="0">
       <a:lnSpc>
         <a:spcPct val="100000"/>
       </a:lnSpc>
@@ -185,17 +185,17 @@
           <a:noFill/>
         </a:ln>
         <a:solidFill>
-          <a:srgbClr val="FFFFFF"/>
+          <a:srgbClr val="4B6079"/>
         </a:solidFill>
         <a:effectLst/>
         <a:uFillTx/>
-        <a:latin typeface="Graphik Light"/>
-        <a:ea typeface="Graphik Light"/>
-        <a:cs typeface="Graphik Light"/>
-        <a:sym typeface="Graphik Light"/>
+        <a:latin typeface="Produkt Extralight"/>
+        <a:ea typeface="Produkt Extralight"/>
+        <a:cs typeface="Produkt Extralight"/>
+        <a:sym typeface="Produkt Extralight"/>
       </a:defRPr>
     </a:lvl5pPr>
-    <a:lvl6pPr marL="0" marR="0" indent="2286000" algn="l" defTabSz="2438338" rtl="0" fontAlgn="auto" latinLnBrk="0" hangingPunct="0">
+    <a:lvl6pPr marL="0" marR="0" indent="0" algn="l" defTabSz="2438337" rtl="0" fontAlgn="auto" latinLnBrk="0" hangingPunct="0">
       <a:lnSpc>
         <a:spcPct val="100000"/>
       </a:lnSpc>
@@ -215,17 +215,17 @@
           <a:noFill/>
         </a:ln>
         <a:solidFill>
-          <a:srgbClr val="FFFFFF"/>
+          <a:srgbClr val="4B6079"/>
         </a:solidFill>
         <a:effectLst/>
         <a:uFillTx/>
-        <a:latin typeface="Graphik Light"/>
-        <a:ea typeface="Graphik Light"/>
-        <a:cs typeface="Graphik Light"/>
-        <a:sym typeface="Graphik Light"/>
+        <a:latin typeface="Produkt Extralight"/>
+        <a:ea typeface="Produkt Extralight"/>
+        <a:cs typeface="Produkt Extralight"/>
+        <a:sym typeface="Produkt Extralight"/>
       </a:defRPr>
     </a:lvl6pPr>
-    <a:lvl7pPr marL="0" marR="0" indent="2743200" algn="l" defTabSz="2438338" rtl="0" fontAlgn="auto" latinLnBrk="0" hangingPunct="0">
+    <a:lvl7pPr marL="0" marR="0" indent="0" algn="l" defTabSz="2438337" rtl="0" fontAlgn="auto" latinLnBrk="0" hangingPunct="0">
       <a:lnSpc>
         <a:spcPct val="100000"/>
       </a:lnSpc>
@@ -245,17 +245,17 @@
           <a:noFill/>
         </a:ln>
         <a:solidFill>
-          <a:srgbClr val="FFFFFF"/>
+          <a:srgbClr val="4B6079"/>
         </a:solidFill>
         <a:effectLst/>
         <a:uFillTx/>
-        <a:latin typeface="Graphik Light"/>
-        <a:ea typeface="Graphik Light"/>
-        <a:cs typeface="Graphik Light"/>
-        <a:sym typeface="Graphik Light"/>
+        <a:latin typeface="Produkt Extralight"/>
+        <a:ea typeface="Produkt Extralight"/>
+        <a:cs typeface="Produkt Extralight"/>
+        <a:sym typeface="Produkt Extralight"/>
       </a:defRPr>
     </a:lvl7pPr>
-    <a:lvl8pPr marL="0" marR="0" indent="3200400" algn="l" defTabSz="2438338" rtl="0" fontAlgn="auto" latinLnBrk="0" hangingPunct="0">
+    <a:lvl8pPr marL="0" marR="0" indent="0" algn="l" defTabSz="2438337" rtl="0" fontAlgn="auto" latinLnBrk="0" hangingPunct="0">
       <a:lnSpc>
         <a:spcPct val="100000"/>
       </a:lnSpc>
@@ -275,17 +275,17 @@
           <a:noFill/>
         </a:ln>
         <a:solidFill>
-          <a:srgbClr val="FFFFFF"/>
+          <a:srgbClr val="4B6079"/>
         </a:solidFill>
         <a:effectLst/>
         <a:uFillTx/>
-        <a:latin typeface="Graphik Light"/>
-        <a:ea typeface="Graphik Light"/>
-        <a:cs typeface="Graphik Light"/>
-        <a:sym typeface="Graphik Light"/>
+        <a:latin typeface="Produkt Extralight"/>
+        <a:ea typeface="Produkt Extralight"/>
+        <a:cs typeface="Produkt Extralight"/>
+        <a:sym typeface="Produkt Extralight"/>
       </a:defRPr>
     </a:lvl8pPr>
-    <a:lvl9pPr marL="0" marR="0" indent="3657600" algn="l" defTabSz="2438338" rtl="0" fontAlgn="auto" latinLnBrk="0" hangingPunct="0">
+    <a:lvl9pPr marL="0" marR="0" indent="0" algn="l" defTabSz="2438337" rtl="0" fontAlgn="auto" latinLnBrk="0" hangingPunct="0">
       <a:lnSpc>
         <a:spcPct val="100000"/>
       </a:lnSpc>
@@ -305,14 +305,14 @@
           <a:noFill/>
         </a:ln>
         <a:solidFill>
-          <a:srgbClr val="FFFFFF"/>
+          <a:srgbClr val="4B6079"/>
         </a:solidFill>
         <a:effectLst/>
         <a:uFillTx/>
-        <a:latin typeface="Graphik Light"/>
-        <a:ea typeface="Graphik Light"/>
-        <a:cs typeface="Graphik Light"/>
-        <a:sym typeface="Graphik Light"/>
+        <a:latin typeface="Produkt Extralight"/>
+        <a:ea typeface="Produkt Extralight"/>
+        <a:cs typeface="Produkt Extralight"/>
+        <a:sym typeface="Produkt Extralight"/>
       </a:defRPr>
     </a:lvl9pPr>
   </p:defaultTextStyle>
@@ -399,9 +399,9 @@
         <a:spcPct val="117999"/>
       </a:lnSpc>
       <a:defRPr sz="2200">
-        <a:latin typeface="Helvetica Neue"/>
-        <a:ea typeface="Helvetica Neue"/>
-        <a:cs typeface="Helvetica Neue"/>
+        <a:latin typeface="+mn-lt"/>
+        <a:ea typeface="+mn-ea"/>
+        <a:cs typeface="+mn-cs"/>
         <a:sym typeface="Helvetica Neue"/>
       </a:defRPr>
     </a:lvl1pPr>
@@ -410,9 +410,9 @@
         <a:spcPct val="117999"/>
       </a:lnSpc>
       <a:defRPr sz="2200">
-        <a:latin typeface="Helvetica Neue"/>
-        <a:ea typeface="Helvetica Neue"/>
-        <a:cs typeface="Helvetica Neue"/>
+        <a:latin typeface="+mn-lt"/>
+        <a:ea typeface="+mn-ea"/>
+        <a:cs typeface="+mn-cs"/>
         <a:sym typeface="Helvetica Neue"/>
       </a:defRPr>
     </a:lvl2pPr>
@@ -421,9 +421,9 @@
         <a:spcPct val="117999"/>
       </a:lnSpc>
       <a:defRPr sz="2200">
-        <a:latin typeface="Helvetica Neue"/>
-        <a:ea typeface="Helvetica Neue"/>
-        <a:cs typeface="Helvetica Neue"/>
+        <a:latin typeface="+mn-lt"/>
+        <a:ea typeface="+mn-ea"/>
+        <a:cs typeface="+mn-cs"/>
         <a:sym typeface="Helvetica Neue"/>
       </a:defRPr>
     </a:lvl3pPr>
@@ -432,9 +432,9 @@
         <a:spcPct val="117999"/>
       </a:lnSpc>
       <a:defRPr sz="2200">
-        <a:latin typeface="Helvetica Neue"/>
-        <a:ea typeface="Helvetica Neue"/>
-        <a:cs typeface="Helvetica Neue"/>
+        <a:latin typeface="+mn-lt"/>
+        <a:ea typeface="+mn-ea"/>
+        <a:cs typeface="+mn-cs"/>
         <a:sym typeface="Helvetica Neue"/>
       </a:defRPr>
     </a:lvl4pPr>
@@ -443,9 +443,9 @@
         <a:spcPct val="117999"/>
       </a:lnSpc>
       <a:defRPr sz="2200">
-        <a:latin typeface="Helvetica Neue"/>
-        <a:ea typeface="Helvetica Neue"/>
-        <a:cs typeface="Helvetica Neue"/>
+        <a:latin typeface="+mn-lt"/>
+        <a:ea typeface="+mn-ea"/>
+        <a:cs typeface="+mn-cs"/>
         <a:sym typeface="Helvetica Neue"/>
       </a:defRPr>
     </a:lvl5pPr>
@@ -454,9 +454,9 @@
         <a:spcPct val="117999"/>
       </a:lnSpc>
       <a:defRPr sz="2200">
-        <a:latin typeface="Helvetica Neue"/>
-        <a:ea typeface="Helvetica Neue"/>
-        <a:cs typeface="Helvetica Neue"/>
+        <a:latin typeface="+mn-lt"/>
+        <a:ea typeface="+mn-ea"/>
+        <a:cs typeface="+mn-cs"/>
         <a:sym typeface="Helvetica Neue"/>
       </a:defRPr>
     </a:lvl6pPr>
@@ -465,9 +465,9 @@
         <a:spcPct val="117999"/>
       </a:lnSpc>
       <a:defRPr sz="2200">
-        <a:latin typeface="Helvetica Neue"/>
-        <a:ea typeface="Helvetica Neue"/>
-        <a:cs typeface="Helvetica Neue"/>
+        <a:latin typeface="+mn-lt"/>
+        <a:ea typeface="+mn-ea"/>
+        <a:cs typeface="+mn-cs"/>
         <a:sym typeface="Helvetica Neue"/>
       </a:defRPr>
     </a:lvl7pPr>
@@ -476,9 +476,9 @@
         <a:spcPct val="117999"/>
       </a:lnSpc>
       <a:defRPr sz="2200">
-        <a:latin typeface="Helvetica Neue"/>
-        <a:ea typeface="Helvetica Neue"/>
-        <a:cs typeface="Helvetica Neue"/>
+        <a:latin typeface="+mn-lt"/>
+        <a:ea typeface="+mn-ea"/>
+        <a:cs typeface="+mn-cs"/>
         <a:sym typeface="Helvetica Neue"/>
       </a:defRPr>
     </a:lvl8pPr>
@@ -487,9 +487,9 @@
         <a:spcPct val="117999"/>
       </a:lnSpc>
       <a:defRPr sz="2200">
-        <a:latin typeface="Helvetica Neue"/>
-        <a:ea typeface="Helvetica Neue"/>
-        <a:cs typeface="Helvetica Neue"/>
+        <a:latin typeface="+mn-lt"/>
+        <a:ea typeface="+mn-ea"/>
+        <a:cs typeface="+mn-cs"/>
         <a:sym typeface="Helvetica Neue"/>
       </a:defRPr>
     </a:lvl9pPr>
@@ -498,7 +498,7 @@
 </file>
 
 <file path=ppt/slideLayouts/slideLayout1.xml><?xml version="1.0" encoding="utf-8"?>
-<p:sldLayout xmlns:a="http://schemas.openxmlformats.org/drawingml/2006/main" xmlns:r="http://schemas.openxmlformats.org/officeDocument/2006/relationships" xmlns:p="http://schemas.openxmlformats.org/presentationml/2006/main" xmlns:m="http://schemas.openxmlformats.org/officeDocument/2006/math" xmlns:a14="http://schemas.microsoft.com/office/drawing/2010/main" type="title" showMasterSp="1" showMasterPhAnim="1">
+<p:sldLayout xmlns:a="http://schemas.openxmlformats.org/drawingml/2006/main" xmlns:r="http://schemas.openxmlformats.org/officeDocument/2006/relationships" xmlns:p="http://schemas.openxmlformats.org/presentationml/2006/main" xmlns:m="http://schemas.openxmlformats.org/officeDocument/2006/math" xmlns:a14="http://schemas.microsoft.com/office/drawing/2010/main" type="tx" showMasterSp="1" showMasterPhAnim="1">
   <p:cSld name="Title">
     <p:spTree>
       <p:nvGrpSpPr>
@@ -516,23 +516,23 @@
       </p:grpSpPr>
       <p:sp>
         <p:nvSpPr>
-          <p:cNvPr id="11" name="Author and Date"/>
+          <p:cNvPr id="11" name="Body Level One…"/>
           <p:cNvSpPr txBox="1"/>
           <p:nvPr>
-            <p:ph type="body" sz="quarter" idx="21" hasCustomPrompt="1"/>
+            <p:ph type="body" sz="quarter" idx="1" hasCustomPrompt="1"/>
           </p:nvPr>
         </p:nvSpPr>
         <p:spPr>
           <a:xfrm>
             <a:off x="1206500" y="12268782"/>
-            <a:ext cx="21971000" cy="660401"/>
+            <a:ext cx="21971000" cy="660402"/>
           </a:xfrm>
           <a:prstGeom prst="rect">
             <a:avLst/>
           </a:prstGeom>
         </p:spPr>
         <p:txBody>
-          <a:bodyPr lIns="45719" tIns="45719" rIns="45719" bIns="45719" anchor="b"/>
+          <a:bodyPr lIns="45718" tIns="45718" rIns="45718" bIns="45718" anchor="b"/>
           <a:lstStyle>
             <a:lvl1pPr marL="0" indent="0" defTabSz="825500">
               <a:spcBef>
@@ -547,11 +547,79 @@
                 <a:sym typeface="Produkt Light"/>
               </a:defRPr>
             </a:lvl1pPr>
+            <a:lvl2pPr marL="834389" indent="-377189" defTabSz="825500">
+              <a:spcBef>
+                <a:spcPts val="0"/>
+              </a:spcBef>
+              <a:defRPr sz="3300">
+                <a:latin typeface="Produkt Light"/>
+                <a:ea typeface="Produkt Light"/>
+                <a:cs typeface="Produkt Light"/>
+                <a:sym typeface="Produkt Light"/>
+              </a:defRPr>
+            </a:lvl2pPr>
+            <a:lvl3pPr marL="1291589" indent="-377189" defTabSz="825500">
+              <a:spcBef>
+                <a:spcPts val="0"/>
+              </a:spcBef>
+              <a:defRPr sz="3300">
+                <a:latin typeface="Produkt Light"/>
+                <a:ea typeface="Produkt Light"/>
+                <a:cs typeface="Produkt Light"/>
+                <a:sym typeface="Produkt Light"/>
+              </a:defRPr>
+            </a:lvl3pPr>
+            <a:lvl4pPr marL="1748789" indent="-377189" defTabSz="825500">
+              <a:spcBef>
+                <a:spcPts val="0"/>
+              </a:spcBef>
+              <a:defRPr sz="3300">
+                <a:latin typeface="Produkt Light"/>
+                <a:ea typeface="Produkt Light"/>
+                <a:cs typeface="Produkt Light"/>
+                <a:sym typeface="Produkt Light"/>
+              </a:defRPr>
+            </a:lvl4pPr>
+            <a:lvl5pPr marL="2205989" indent="-377189" defTabSz="825500">
+              <a:spcBef>
+                <a:spcPts val="0"/>
+              </a:spcBef>
+              <a:defRPr sz="3300">
+                <a:latin typeface="Produkt Light"/>
+                <a:ea typeface="Produkt Light"/>
+                <a:cs typeface="Produkt Light"/>
+                <a:sym typeface="Produkt Light"/>
+              </a:defRPr>
+            </a:lvl5pPr>
           </a:lstStyle>
           <a:p>
             <a:pPr/>
             <a:r>
               <a:t>Author and Date</a:t>
+            </a:r>
+          </a:p>
+          <a:p>
+            <a:pPr lvl="1"/>
+            <a:r>
+              <a:t/>
+            </a:r>
+          </a:p>
+          <a:p>
+            <a:pPr lvl="2"/>
+            <a:r>
+              <a:t/>
+            </a:r>
+          </a:p>
+          <a:p>
+            <a:pPr lvl="3"/>
+            <a:r>
+              <a:t/>
+            </a:r>
+          </a:p>
+          <a:p>
+            <a:pPr lvl="4"/>
+            <a:r>
+              <a:t/>
             </a:r>
           </a:p>
         </p:txBody>
@@ -561,13 +629,13 @@
           <p:cNvPr id="12" name="Body Level One…"/>
           <p:cNvSpPr txBox="1"/>
           <p:nvPr>
-            <p:ph type="body" sz="quarter" idx="1" hasCustomPrompt="1"/>
+            <p:ph type="body" sz="quarter" idx="21" hasCustomPrompt="1"/>
           </p:nvPr>
         </p:nvSpPr>
         <p:spPr>
           <a:xfrm>
             <a:off x="1206500" y="7357839"/>
-            <a:ext cx="21971000" cy="2006601"/>
+            <a:ext cx="21971000" cy="2006602"/>
           </a:xfrm>
           <a:prstGeom prst="rect">
             <a:avLst/>
@@ -583,93 +651,17 @@
               <a:buSzTx/>
               <a:buNone/>
               <a:defRPr sz="5500">
-                <a:latin typeface="+mn-lt"/>
-                <a:ea typeface="+mn-ea"/>
-                <a:cs typeface="+mn-cs"/>
+                <a:latin typeface="Produkt Extralight"/>
+                <a:ea typeface="Produkt Extralight"/>
+                <a:cs typeface="Produkt Extralight"/>
                 <a:sym typeface="Produkt Extralight"/>
               </a:defRPr>
             </a:lvl1pPr>
-            <a:lvl2pPr marL="0" indent="457200" defTabSz="825500">
-              <a:spcBef>
-                <a:spcPts val="0"/>
-              </a:spcBef>
-              <a:buSzTx/>
-              <a:buNone/>
-              <a:defRPr sz="5500">
-                <a:latin typeface="+mn-lt"/>
-                <a:ea typeface="+mn-ea"/>
-                <a:cs typeface="+mn-cs"/>
-                <a:sym typeface="Produkt Extralight"/>
-              </a:defRPr>
-            </a:lvl2pPr>
-            <a:lvl3pPr marL="0" indent="914400" defTabSz="825500">
-              <a:spcBef>
-                <a:spcPts val="0"/>
-              </a:spcBef>
-              <a:buSzTx/>
-              <a:buNone/>
-              <a:defRPr sz="5500">
-                <a:latin typeface="+mn-lt"/>
-                <a:ea typeface="+mn-ea"/>
-                <a:cs typeface="+mn-cs"/>
-                <a:sym typeface="Produkt Extralight"/>
-              </a:defRPr>
-            </a:lvl3pPr>
-            <a:lvl4pPr marL="0" indent="1371600" defTabSz="825500">
-              <a:spcBef>
-                <a:spcPts val="0"/>
-              </a:spcBef>
-              <a:buSzTx/>
-              <a:buNone/>
-              <a:defRPr sz="5500">
-                <a:latin typeface="+mn-lt"/>
-                <a:ea typeface="+mn-ea"/>
-                <a:cs typeface="+mn-cs"/>
-                <a:sym typeface="Produkt Extralight"/>
-              </a:defRPr>
-            </a:lvl4pPr>
-            <a:lvl5pPr marL="0" indent="1828800" defTabSz="825500">
-              <a:spcBef>
-                <a:spcPts val="0"/>
-              </a:spcBef>
-              <a:buSzTx/>
-              <a:buNone/>
-              <a:defRPr sz="5500">
-                <a:latin typeface="+mn-lt"/>
-                <a:ea typeface="+mn-ea"/>
-                <a:cs typeface="+mn-cs"/>
-                <a:sym typeface="Produkt Extralight"/>
-              </a:defRPr>
-            </a:lvl5pPr>
           </a:lstStyle>
           <a:p>
             <a:pPr/>
             <a:r>
               <a:t>Presentation Subtitle</a:t>
-            </a:r>
-          </a:p>
-          <a:p>
-            <a:pPr lvl="1"/>
-            <a:r>
-              <a:t/>
-            </a:r>
-          </a:p>
-          <a:p>
-            <a:pPr lvl="2"/>
-            <a:r>
-              <a:t/>
-            </a:r>
-          </a:p>
-          <a:p>
-            <a:pPr lvl="3"/>
-            <a:r>
-              <a:t/>
-            </a:r>
-          </a:p>
-          <a:p>
-            <a:pPr lvl="4"/>
-            <a:r>
-              <a:t/>
             </a:r>
           </a:p>
         </p:txBody>
@@ -685,7 +677,7 @@
         <p:spPr>
           <a:xfrm>
             <a:off x="1206500" y="2621719"/>
-            <a:ext cx="21971000" cy="4648201"/>
+            <a:ext cx="21971000" cy="4648202"/>
           </a:xfrm>
           <a:prstGeom prst="rect">
             <a:avLst/>
@@ -763,6 +755,10 @@
           </p:nvPr>
         </p:nvSpPr>
         <p:spPr>
+          <a:xfrm>
+            <a:off x="1206500" y="635000"/>
+            <a:ext cx="21971000" cy="1689100"/>
+          </a:xfrm>
           <a:prstGeom prst="rect">
             <a:avLst/>
           </a:prstGeom>
@@ -780,10 +776,10 @@
       </p:sp>
       <p:sp>
         <p:nvSpPr>
-          <p:cNvPr id="100" name="Slide Subtitle"/>
+          <p:cNvPr id="100" name="Body Level One…"/>
           <p:cNvSpPr txBox="1"/>
           <p:nvPr>
-            <p:ph type="body" sz="quarter" idx="21" hasCustomPrompt="1"/>
+            <p:ph type="body" sz="quarter" idx="1" hasCustomPrompt="1"/>
           </p:nvPr>
         </p:nvSpPr>
         <p:spPr>
@@ -796,7 +792,7 @@
           </a:prstGeom>
         </p:spPr>
         <p:txBody>
-          <a:bodyPr lIns="45719" tIns="45719" rIns="45719" bIns="45719"/>
+          <a:bodyPr lIns="45718" tIns="45718" rIns="45718" bIns="45718"/>
           <a:lstStyle>
             <a:lvl1pPr marL="0" indent="0" defTabSz="825500">
               <a:spcBef>
@@ -805,17 +801,85 @@
               <a:buSzTx/>
               <a:buNone/>
               <a:defRPr sz="5500">
-                <a:latin typeface="+mn-lt"/>
-                <a:ea typeface="+mn-ea"/>
-                <a:cs typeface="+mn-cs"/>
+                <a:latin typeface="Produkt Extralight"/>
+                <a:ea typeface="Produkt Extralight"/>
+                <a:cs typeface="Produkt Extralight"/>
                 <a:sym typeface="Produkt Extralight"/>
               </a:defRPr>
             </a:lvl1pPr>
+            <a:lvl2pPr marL="1085850" indent="-628650" defTabSz="825500">
+              <a:spcBef>
+                <a:spcPts val="0"/>
+              </a:spcBef>
+              <a:defRPr sz="5500">
+                <a:latin typeface="Produkt Extralight"/>
+                <a:ea typeface="Produkt Extralight"/>
+                <a:cs typeface="Produkt Extralight"/>
+                <a:sym typeface="Produkt Extralight"/>
+              </a:defRPr>
+            </a:lvl2pPr>
+            <a:lvl3pPr marL="1543050" indent="-628650" defTabSz="825500">
+              <a:spcBef>
+                <a:spcPts val="0"/>
+              </a:spcBef>
+              <a:defRPr sz="5500">
+                <a:latin typeface="Produkt Extralight"/>
+                <a:ea typeface="Produkt Extralight"/>
+                <a:cs typeface="Produkt Extralight"/>
+                <a:sym typeface="Produkt Extralight"/>
+              </a:defRPr>
+            </a:lvl3pPr>
+            <a:lvl4pPr marL="2000250" indent="-628650" defTabSz="825500">
+              <a:spcBef>
+                <a:spcPts val="0"/>
+              </a:spcBef>
+              <a:defRPr sz="5500">
+                <a:latin typeface="Produkt Extralight"/>
+                <a:ea typeface="Produkt Extralight"/>
+                <a:cs typeface="Produkt Extralight"/>
+                <a:sym typeface="Produkt Extralight"/>
+              </a:defRPr>
+            </a:lvl4pPr>
+            <a:lvl5pPr marL="2457450" indent="-628650" defTabSz="825500">
+              <a:spcBef>
+                <a:spcPts val="0"/>
+              </a:spcBef>
+              <a:defRPr sz="5500">
+                <a:latin typeface="Produkt Extralight"/>
+                <a:ea typeface="Produkt Extralight"/>
+                <a:cs typeface="Produkt Extralight"/>
+                <a:sym typeface="Produkt Extralight"/>
+              </a:defRPr>
+            </a:lvl5pPr>
           </a:lstStyle>
           <a:p>
             <a:pPr/>
             <a:r>
               <a:t>Slide Subtitle</a:t>
+            </a:r>
+          </a:p>
+          <a:p>
+            <a:pPr lvl="1"/>
+            <a:r>
+              <a:t/>
+            </a:r>
+          </a:p>
+          <a:p>
+            <a:pPr lvl="2"/>
+            <a:r>
+              <a:t/>
+            </a:r>
+          </a:p>
+          <a:p>
+            <a:pPr lvl="3"/>
+            <a:r>
+              <a:t/>
+            </a:r>
+          </a:p>
+          <a:p>
+            <a:pPr lvl="4"/>
+            <a:r>
+              <a:t/>
             </a:r>
           </a:p>
         </p:txBody>
@@ -870,10 +934,10 @@
       </p:grpSpPr>
       <p:sp>
         <p:nvSpPr>
-          <p:cNvPr id="108" name="Agenda Subtitle"/>
+          <p:cNvPr id="108" name="Body Level One…"/>
           <p:cNvSpPr txBox="1"/>
           <p:nvPr>
-            <p:ph type="body" sz="quarter" idx="21" hasCustomPrompt="1"/>
+            <p:ph type="body" sz="quarter" idx="1" hasCustomPrompt="1"/>
           </p:nvPr>
         </p:nvSpPr>
         <p:spPr>
@@ -886,7 +950,7 @@
           </a:prstGeom>
         </p:spPr>
         <p:txBody>
-          <a:bodyPr lIns="45719" tIns="45719" rIns="45719" bIns="45719"/>
+          <a:bodyPr lIns="45718" tIns="45718" rIns="45718" bIns="45718"/>
           <a:lstStyle>
             <a:lvl1pPr marL="0" indent="0" defTabSz="825500">
               <a:spcBef>
@@ -895,17 +959,85 @@
               <a:buSzTx/>
               <a:buNone/>
               <a:defRPr sz="5500">
-                <a:latin typeface="+mn-lt"/>
-                <a:ea typeface="+mn-ea"/>
-                <a:cs typeface="+mn-cs"/>
+                <a:latin typeface="Produkt Extralight"/>
+                <a:ea typeface="Produkt Extralight"/>
+                <a:cs typeface="Produkt Extralight"/>
                 <a:sym typeface="Produkt Extralight"/>
               </a:defRPr>
             </a:lvl1pPr>
+            <a:lvl2pPr marL="1085850" indent="-628650" defTabSz="825500">
+              <a:spcBef>
+                <a:spcPts val="0"/>
+              </a:spcBef>
+              <a:defRPr sz="5500">
+                <a:latin typeface="Produkt Extralight"/>
+                <a:ea typeface="Produkt Extralight"/>
+                <a:cs typeface="Produkt Extralight"/>
+                <a:sym typeface="Produkt Extralight"/>
+              </a:defRPr>
+            </a:lvl2pPr>
+            <a:lvl3pPr marL="1543050" indent="-628650" defTabSz="825500">
+              <a:spcBef>
+                <a:spcPts val="0"/>
+              </a:spcBef>
+              <a:defRPr sz="5500">
+                <a:latin typeface="Produkt Extralight"/>
+                <a:ea typeface="Produkt Extralight"/>
+                <a:cs typeface="Produkt Extralight"/>
+                <a:sym typeface="Produkt Extralight"/>
+              </a:defRPr>
+            </a:lvl3pPr>
+            <a:lvl4pPr marL="2000250" indent="-628650" defTabSz="825500">
+              <a:spcBef>
+                <a:spcPts val="0"/>
+              </a:spcBef>
+              <a:defRPr sz="5500">
+                <a:latin typeface="Produkt Extralight"/>
+                <a:ea typeface="Produkt Extralight"/>
+                <a:cs typeface="Produkt Extralight"/>
+                <a:sym typeface="Produkt Extralight"/>
+              </a:defRPr>
+            </a:lvl4pPr>
+            <a:lvl5pPr marL="2457450" indent="-628650" defTabSz="825500">
+              <a:spcBef>
+                <a:spcPts val="0"/>
+              </a:spcBef>
+              <a:defRPr sz="5500">
+                <a:latin typeface="Produkt Extralight"/>
+                <a:ea typeface="Produkt Extralight"/>
+                <a:cs typeface="Produkt Extralight"/>
+                <a:sym typeface="Produkt Extralight"/>
+              </a:defRPr>
+            </a:lvl5pPr>
           </a:lstStyle>
           <a:p>
             <a:pPr/>
             <a:r>
               <a:t>Agenda Subtitle</a:t>
+            </a:r>
+          </a:p>
+          <a:p>
+            <a:pPr lvl="1"/>
+            <a:r>
+              <a:t/>
+            </a:r>
+          </a:p>
+          <a:p>
+            <a:pPr lvl="2"/>
+            <a:r>
+              <a:t/>
+            </a:r>
+          </a:p>
+          <a:p>
+            <a:pPr lvl="3"/>
+            <a:r>
+              <a:t/>
+            </a:r>
+          </a:p>
+          <a:p>
+            <a:pPr lvl="4"/>
+            <a:r>
+              <a:t/>
             </a:r>
           </a:p>
         </p:txBody>
@@ -915,13 +1047,13 @@
           <p:cNvPr id="109" name="Body Level One…"/>
           <p:cNvSpPr txBox="1"/>
           <p:nvPr>
-            <p:ph type="body" idx="1" hasCustomPrompt="1"/>
+            <p:ph type="body" idx="21" hasCustomPrompt="1"/>
           </p:nvPr>
         </p:nvSpPr>
         <p:spPr>
           <a:xfrm>
-            <a:off x="1206500" y="4248504"/>
-            <a:ext cx="21971000" cy="8256012"/>
+            <a:off x="1206500" y="4248503"/>
+            <a:ext cx="21971000" cy="8256014"/>
           </a:xfrm>
           <a:prstGeom prst="rect">
             <a:avLst/>
@@ -938,67 +1070,11 @@
               <a:buNone/>
               <a:defRPr sz="5000"/>
             </a:lvl1pPr>
-            <a:lvl2pPr marL="0" indent="457200" defTabSz="825500">
-              <a:spcBef>
-                <a:spcPts val="6000"/>
-              </a:spcBef>
-              <a:buSzTx/>
-              <a:buNone/>
-              <a:defRPr sz="5000"/>
-            </a:lvl2pPr>
-            <a:lvl3pPr marL="0" indent="914400" defTabSz="825500">
-              <a:spcBef>
-                <a:spcPts val="6000"/>
-              </a:spcBef>
-              <a:buSzTx/>
-              <a:buNone/>
-              <a:defRPr sz="5000"/>
-            </a:lvl3pPr>
-            <a:lvl4pPr marL="0" indent="1371600" defTabSz="825500">
-              <a:spcBef>
-                <a:spcPts val="6000"/>
-              </a:spcBef>
-              <a:buSzTx/>
-              <a:buNone/>
-              <a:defRPr sz="5000"/>
-            </a:lvl4pPr>
-            <a:lvl5pPr marL="0" indent="1828800" defTabSz="825500">
-              <a:spcBef>
-                <a:spcPts val="6000"/>
-              </a:spcBef>
-              <a:buSzTx/>
-              <a:buNone/>
-              <a:defRPr sz="5000"/>
-            </a:lvl5pPr>
           </a:lstStyle>
           <a:p>
             <a:pPr/>
             <a:r>
               <a:t>Agenda Topics</a:t>
-            </a:r>
-          </a:p>
-          <a:p>
-            <a:pPr lvl="1"/>
-            <a:r>
-              <a:t/>
-            </a:r>
-          </a:p>
-          <a:p>
-            <a:pPr lvl="2"/>
-            <a:r>
-              <a:t/>
-            </a:r>
-          </a:p>
-          <a:p>
-            <a:pPr lvl="3"/>
-            <a:r>
-              <a:t/>
-            </a:r>
-          </a:p>
-          <a:p>
-            <a:pPr lvl="4"/>
-            <a:r>
-              <a:t/>
             </a:r>
           </a:p>
         </p:txBody>
@@ -1012,6 +1088,10 @@
           </p:nvPr>
         </p:nvSpPr>
         <p:spPr>
+          <a:xfrm>
+            <a:off x="1206500" y="635000"/>
+            <a:ext cx="21971000" cy="1689100"/>
+          </a:xfrm>
           <a:prstGeom prst="rect">
             <a:avLst/>
           </a:prstGeom>
@@ -1105,13 +1185,13 @@
               <a:buSzTx/>
               <a:buNone/>
               <a:defRPr spc="-119" sz="12000">
-                <a:latin typeface="+mn-lt"/>
-                <a:ea typeface="+mn-ea"/>
-                <a:cs typeface="+mn-cs"/>
+                <a:latin typeface="Produkt Extralight"/>
+                <a:ea typeface="Produkt Extralight"/>
+                <a:cs typeface="Produkt Extralight"/>
                 <a:sym typeface="Produkt Extralight"/>
               </a:defRPr>
             </a:lvl1pPr>
-            <a:lvl2pPr marL="0" indent="457200" algn="ctr">
+            <a:lvl2pPr marL="0" indent="0" algn="ctr">
               <a:lnSpc>
                 <a:spcPct val="90000"/>
               </a:lnSpc>
@@ -1121,13 +1201,13 @@
               <a:buSzTx/>
               <a:buNone/>
               <a:defRPr spc="-119" sz="12000">
-                <a:latin typeface="+mn-lt"/>
-                <a:ea typeface="+mn-ea"/>
-                <a:cs typeface="+mn-cs"/>
+                <a:latin typeface="Produkt Extralight"/>
+                <a:ea typeface="Produkt Extralight"/>
+                <a:cs typeface="Produkt Extralight"/>
                 <a:sym typeface="Produkt Extralight"/>
               </a:defRPr>
             </a:lvl2pPr>
-            <a:lvl3pPr marL="0" indent="914400" algn="ctr">
+            <a:lvl3pPr marL="0" indent="0" algn="ctr">
               <a:lnSpc>
                 <a:spcPct val="90000"/>
               </a:lnSpc>
@@ -1137,13 +1217,13 @@
               <a:buSzTx/>
               <a:buNone/>
               <a:defRPr spc="-119" sz="12000">
-                <a:latin typeface="+mn-lt"/>
-                <a:ea typeface="+mn-ea"/>
-                <a:cs typeface="+mn-cs"/>
+                <a:latin typeface="Produkt Extralight"/>
+                <a:ea typeface="Produkt Extralight"/>
+                <a:cs typeface="Produkt Extralight"/>
                 <a:sym typeface="Produkt Extralight"/>
               </a:defRPr>
             </a:lvl3pPr>
-            <a:lvl4pPr marL="0" indent="1371600" algn="ctr">
+            <a:lvl4pPr marL="0" indent="0" algn="ctr">
               <a:lnSpc>
                 <a:spcPct val="90000"/>
               </a:lnSpc>
@@ -1153,13 +1233,13 @@
               <a:buSzTx/>
               <a:buNone/>
               <a:defRPr spc="-119" sz="12000">
-                <a:latin typeface="+mn-lt"/>
-                <a:ea typeface="+mn-ea"/>
-                <a:cs typeface="+mn-cs"/>
+                <a:latin typeface="Produkt Extralight"/>
+                <a:ea typeface="Produkt Extralight"/>
+                <a:cs typeface="Produkt Extralight"/>
                 <a:sym typeface="Produkt Extralight"/>
               </a:defRPr>
             </a:lvl4pPr>
-            <a:lvl5pPr marL="0" indent="1828800" algn="ctr">
+            <a:lvl5pPr marL="0" indent="0" algn="ctr">
               <a:lnSpc>
                 <a:spcPct val="90000"/>
               </a:lnSpc>
@@ -1169,9 +1249,9 @@
               <a:buSzTx/>
               <a:buNone/>
               <a:defRPr spc="-119" sz="12000">
-                <a:latin typeface="+mn-lt"/>
-                <a:ea typeface="+mn-ea"/>
-                <a:cs typeface="+mn-cs"/>
+                <a:latin typeface="Produkt Extralight"/>
+                <a:ea typeface="Produkt Extralight"/>
+                <a:cs typeface="Produkt Extralight"/>
                 <a:sym typeface="Produkt Extralight"/>
               </a:defRPr>
             </a:lvl5pPr>
@@ -1267,7 +1347,7 @@
         <p:spPr>
           <a:xfrm>
             <a:off x="1206500" y="1207360"/>
-            <a:ext cx="21971000" cy="7351451"/>
+            <a:ext cx="21971000" cy="7351452"/>
           </a:xfrm>
           <a:prstGeom prst="rect">
             <a:avLst/>
@@ -1286,13 +1366,13 @@
               <a:buSzTx/>
               <a:buNone/>
               <a:defRPr spc="-1750" sz="35000">
-                <a:latin typeface="+mn-lt"/>
-                <a:ea typeface="+mn-ea"/>
-                <a:cs typeface="+mn-cs"/>
+                <a:latin typeface="Produkt Extralight"/>
+                <a:ea typeface="Produkt Extralight"/>
+                <a:cs typeface="Produkt Extralight"/>
                 <a:sym typeface="Produkt Extralight"/>
               </a:defRPr>
             </a:lvl1pPr>
-            <a:lvl2pPr marL="0" indent="457200" algn="ctr">
+            <a:lvl2pPr marL="0" indent="0" algn="ctr">
               <a:lnSpc>
                 <a:spcPct val="90000"/>
               </a:lnSpc>
@@ -1302,13 +1382,13 @@
               <a:buSzTx/>
               <a:buNone/>
               <a:defRPr spc="-1750" sz="35000">
-                <a:latin typeface="+mn-lt"/>
-                <a:ea typeface="+mn-ea"/>
-                <a:cs typeface="+mn-cs"/>
+                <a:latin typeface="Produkt Extralight"/>
+                <a:ea typeface="Produkt Extralight"/>
+                <a:cs typeface="Produkt Extralight"/>
                 <a:sym typeface="Produkt Extralight"/>
               </a:defRPr>
             </a:lvl2pPr>
-            <a:lvl3pPr marL="0" indent="914400" algn="ctr">
+            <a:lvl3pPr marL="0" indent="0" algn="ctr">
               <a:lnSpc>
                 <a:spcPct val="90000"/>
               </a:lnSpc>
@@ -1318,13 +1398,13 @@
               <a:buSzTx/>
               <a:buNone/>
               <a:defRPr spc="-1750" sz="35000">
-                <a:latin typeface="+mn-lt"/>
-                <a:ea typeface="+mn-ea"/>
-                <a:cs typeface="+mn-cs"/>
+                <a:latin typeface="Produkt Extralight"/>
+                <a:ea typeface="Produkt Extralight"/>
+                <a:cs typeface="Produkt Extralight"/>
                 <a:sym typeface="Produkt Extralight"/>
               </a:defRPr>
             </a:lvl3pPr>
-            <a:lvl4pPr marL="0" indent="1371600" algn="ctr">
+            <a:lvl4pPr marL="0" indent="0" algn="ctr">
               <a:lnSpc>
                 <a:spcPct val="90000"/>
               </a:lnSpc>
@@ -1334,13 +1414,13 @@
               <a:buSzTx/>
               <a:buNone/>
               <a:defRPr spc="-1750" sz="35000">
-                <a:latin typeface="+mn-lt"/>
-                <a:ea typeface="+mn-ea"/>
-                <a:cs typeface="+mn-cs"/>
+                <a:latin typeface="Produkt Extralight"/>
+                <a:ea typeface="Produkt Extralight"/>
+                <a:cs typeface="Produkt Extralight"/>
                 <a:sym typeface="Produkt Extralight"/>
               </a:defRPr>
             </a:lvl4pPr>
-            <a:lvl5pPr marL="0" indent="1828800" algn="ctr">
+            <a:lvl5pPr marL="0" indent="0" algn="ctr">
               <a:lnSpc>
                 <a:spcPct val="90000"/>
               </a:lnSpc>
@@ -1350,9 +1430,9 @@
               <a:buSzTx/>
               <a:buNone/>
               <a:defRPr spc="-1750" sz="35000">
-                <a:latin typeface="+mn-lt"/>
-                <a:ea typeface="+mn-ea"/>
-                <a:cs typeface="+mn-cs"/>
+                <a:latin typeface="Produkt Extralight"/>
+                <a:ea typeface="Produkt Extralight"/>
+                <a:cs typeface="Produkt Extralight"/>
                 <a:sym typeface="Produkt Extralight"/>
               </a:defRPr>
             </a:lvl5pPr>
@@ -1407,7 +1487,7 @@
           </a:prstGeom>
         </p:spPr>
         <p:txBody>
-          <a:bodyPr lIns="45719" tIns="45719" rIns="45719" bIns="45719"/>
+          <a:bodyPr lIns="45718" tIns="45718" rIns="45718" bIns="45718"/>
           <a:lstStyle>
             <a:lvl1pPr marL="0" indent="0" algn="ctr" defTabSz="825500">
               <a:lnSpc>
@@ -1418,10 +1498,10 @@
               </a:spcBef>
               <a:buSzTx/>
               <a:buNone/>
-              <a:defRPr spc="-55" sz="5500">
-                <a:latin typeface="+mn-lt"/>
-                <a:ea typeface="+mn-ea"/>
-                <a:cs typeface="+mn-cs"/>
+              <a:defRPr spc="-99" sz="5500">
+                <a:latin typeface="Produkt Extralight"/>
+                <a:ea typeface="Produkt Extralight"/>
+                <a:cs typeface="Produkt Extralight"/>
                 <a:sym typeface="Produkt Extralight"/>
               </a:defRPr>
             </a:lvl1pPr>
@@ -1512,13 +1592,13 @@
               <a:buSzTx/>
               <a:buNone/>
               <a:defRPr spc="-93" sz="9300">
-                <a:latin typeface="+mn-lt"/>
-                <a:ea typeface="+mn-ea"/>
-                <a:cs typeface="+mn-cs"/>
+                <a:latin typeface="Produkt Extralight"/>
+                <a:ea typeface="Produkt Extralight"/>
+                <a:cs typeface="Produkt Extralight"/>
                 <a:sym typeface="Produkt Extralight"/>
               </a:defRPr>
             </a:lvl1pPr>
-            <a:lvl2pPr marL="254000" indent="203200">
+            <a:lvl2pPr marL="254000" indent="0">
               <a:lnSpc>
                 <a:spcPct val="90000"/>
               </a:lnSpc>
@@ -1528,13 +1608,13 @@
               <a:buSzTx/>
               <a:buNone/>
               <a:defRPr spc="-93" sz="9300">
-                <a:latin typeface="+mn-lt"/>
-                <a:ea typeface="+mn-ea"/>
-                <a:cs typeface="+mn-cs"/>
+                <a:latin typeface="Produkt Extralight"/>
+                <a:ea typeface="Produkt Extralight"/>
+                <a:cs typeface="Produkt Extralight"/>
                 <a:sym typeface="Produkt Extralight"/>
               </a:defRPr>
             </a:lvl2pPr>
-            <a:lvl3pPr marL="254000" indent="660400">
+            <a:lvl3pPr marL="254000" indent="0">
               <a:lnSpc>
                 <a:spcPct val="90000"/>
               </a:lnSpc>
@@ -1544,13 +1624,13 @@
               <a:buSzTx/>
               <a:buNone/>
               <a:defRPr spc="-93" sz="9300">
-                <a:latin typeface="+mn-lt"/>
-                <a:ea typeface="+mn-ea"/>
-                <a:cs typeface="+mn-cs"/>
+                <a:latin typeface="Produkt Extralight"/>
+                <a:ea typeface="Produkt Extralight"/>
+                <a:cs typeface="Produkt Extralight"/>
                 <a:sym typeface="Produkt Extralight"/>
               </a:defRPr>
             </a:lvl3pPr>
-            <a:lvl4pPr marL="254000" indent="1117600">
+            <a:lvl4pPr marL="254000" indent="0">
               <a:lnSpc>
                 <a:spcPct val="90000"/>
               </a:lnSpc>
@@ -1560,13 +1640,13 @@
               <a:buSzTx/>
               <a:buNone/>
               <a:defRPr spc="-93" sz="9300">
-                <a:latin typeface="+mn-lt"/>
-                <a:ea typeface="+mn-ea"/>
-                <a:cs typeface="+mn-cs"/>
+                <a:latin typeface="Produkt Extralight"/>
+                <a:ea typeface="Produkt Extralight"/>
+                <a:cs typeface="Produkt Extralight"/>
                 <a:sym typeface="Produkt Extralight"/>
               </a:defRPr>
             </a:lvl4pPr>
-            <a:lvl5pPr marL="254000" indent="1574800">
+            <a:lvl5pPr marL="254000" indent="0">
               <a:lnSpc>
                 <a:spcPct val="90000"/>
               </a:lnSpc>
@@ -1576,9 +1656,9 @@
               <a:buSzTx/>
               <a:buNone/>
               <a:defRPr spc="-93" sz="9300">
-                <a:latin typeface="+mn-lt"/>
-                <a:ea typeface="+mn-ea"/>
-                <a:cs typeface="+mn-cs"/>
+                <a:latin typeface="Produkt Extralight"/>
+                <a:ea typeface="Produkt Extralight"/>
+                <a:cs typeface="Produkt Extralight"/>
                 <a:sym typeface="Produkt Extralight"/>
               </a:defRPr>
             </a:lvl5pPr>
@@ -1625,15 +1705,15 @@
         </p:nvSpPr>
         <p:spPr>
           <a:xfrm>
-            <a:off x="5456257" y="9559997"/>
-            <a:ext cx="13471486" cy="698501"/>
+            <a:off x="5456256" y="9559997"/>
+            <a:ext cx="13471487" cy="698502"/>
           </a:xfrm>
           <a:prstGeom prst="rect">
             <a:avLst/>
           </a:prstGeom>
         </p:spPr>
         <p:txBody>
-          <a:bodyPr lIns="45719" tIns="45719" rIns="45719" bIns="45719"/>
+          <a:bodyPr lIns="45718" tIns="45718" rIns="45718" bIns="45718"/>
           <a:lstStyle>
             <a:lvl1pPr marL="0" indent="0" defTabSz="825500">
               <a:spcBef>
@@ -1769,8 +1849,8 @@
         </p:nvSpPr>
         <p:spPr>
           <a:xfrm>
-            <a:off x="61386" y="3632200"/>
-            <a:ext cx="9690101" cy="6451600"/>
+            <a:off x="61385" y="3632200"/>
+            <a:ext cx="9690102" cy="6451600"/>
           </a:xfrm>
           <a:prstGeom prst="rect">
             <a:avLst/>
@@ -1980,7 +2060,7 @@
         <p:spPr>
           <a:xfrm>
             <a:off x="0" y="-4381500"/>
-            <a:ext cx="24384001" cy="18288000"/>
+            <a:ext cx="24384002" cy="18288000"/>
           </a:xfrm>
           <a:prstGeom prst="rect">
             <a:avLst/>
@@ -1998,10 +2078,10 @@
       </p:sp>
       <p:sp>
         <p:nvSpPr>
-          <p:cNvPr id="22" name="Author and Date"/>
+          <p:cNvPr id="22" name="Body Level One…"/>
           <p:cNvSpPr txBox="1"/>
           <p:nvPr>
-            <p:ph type="body" sz="quarter" idx="22" hasCustomPrompt="1"/>
+            <p:ph type="body" sz="quarter" idx="1" hasCustomPrompt="1"/>
           </p:nvPr>
         </p:nvSpPr>
         <p:spPr>
@@ -2014,7 +2094,7 @@
           </a:prstGeom>
         </p:spPr>
         <p:txBody>
-          <a:bodyPr lIns="45719" tIns="45719" rIns="45719" bIns="45719" anchor="b"/>
+          <a:bodyPr lIns="45718" tIns="45718" rIns="45718" bIns="45718" anchor="b"/>
           <a:lstStyle>
             <a:lvl1pPr marL="0" indent="0" defTabSz="825500">
               <a:spcBef>
@@ -2029,11 +2109,79 @@
                 <a:sym typeface="Produkt Light"/>
               </a:defRPr>
             </a:lvl1pPr>
+            <a:lvl2pPr marL="834389" indent="-377189" defTabSz="825500">
+              <a:spcBef>
+                <a:spcPts val="0"/>
+              </a:spcBef>
+              <a:defRPr sz="3300">
+                <a:latin typeface="Produkt Light"/>
+                <a:ea typeface="Produkt Light"/>
+                <a:cs typeface="Produkt Light"/>
+                <a:sym typeface="Produkt Light"/>
+              </a:defRPr>
+            </a:lvl2pPr>
+            <a:lvl3pPr marL="1291589" indent="-377189" defTabSz="825500">
+              <a:spcBef>
+                <a:spcPts val="0"/>
+              </a:spcBef>
+              <a:defRPr sz="3300">
+                <a:latin typeface="Produkt Light"/>
+                <a:ea typeface="Produkt Light"/>
+                <a:cs typeface="Produkt Light"/>
+                <a:sym typeface="Produkt Light"/>
+              </a:defRPr>
+            </a:lvl3pPr>
+            <a:lvl4pPr marL="1748789" indent="-377189" defTabSz="825500">
+              <a:spcBef>
+                <a:spcPts val="0"/>
+              </a:spcBef>
+              <a:defRPr sz="3300">
+                <a:latin typeface="Produkt Light"/>
+                <a:ea typeface="Produkt Light"/>
+                <a:cs typeface="Produkt Light"/>
+                <a:sym typeface="Produkt Light"/>
+              </a:defRPr>
+            </a:lvl4pPr>
+            <a:lvl5pPr marL="2205989" indent="-377189" defTabSz="825500">
+              <a:spcBef>
+                <a:spcPts val="0"/>
+              </a:spcBef>
+              <a:defRPr sz="3300">
+                <a:latin typeface="Produkt Light"/>
+                <a:ea typeface="Produkt Light"/>
+                <a:cs typeface="Produkt Light"/>
+                <a:sym typeface="Produkt Light"/>
+              </a:defRPr>
+            </a:lvl5pPr>
           </a:lstStyle>
           <a:p>
             <a:pPr/>
             <a:r>
               <a:t>Author and Date</a:t>
+            </a:r>
+          </a:p>
+          <a:p>
+            <a:pPr lvl="1"/>
+            <a:r>
+              <a:t/>
+            </a:r>
+          </a:p>
+          <a:p>
+            <a:pPr lvl="2"/>
+            <a:r>
+              <a:t/>
+            </a:r>
+          </a:p>
+          <a:p>
+            <a:pPr lvl="3"/>
+            <a:r>
+              <a:t/>
+            </a:r>
+          </a:p>
+          <a:p>
+            <a:pPr lvl="4"/>
+            <a:r>
+              <a:t/>
             </a:r>
           </a:p>
         </p:txBody>
@@ -2043,7 +2191,7 @@
           <p:cNvPr id="23" name="Body Level One…"/>
           <p:cNvSpPr txBox="1"/>
           <p:nvPr>
-            <p:ph type="body" sz="quarter" idx="1" hasCustomPrompt="1"/>
+            <p:ph type="body" sz="quarter" idx="22" hasCustomPrompt="1"/>
           </p:nvPr>
         </p:nvSpPr>
         <p:spPr>
@@ -2065,93 +2213,17 @@
               <a:buSzTx/>
               <a:buNone/>
               <a:defRPr sz="5500">
-                <a:latin typeface="+mn-lt"/>
-                <a:ea typeface="+mn-ea"/>
-                <a:cs typeface="+mn-cs"/>
+                <a:latin typeface="Produkt Extralight"/>
+                <a:ea typeface="Produkt Extralight"/>
+                <a:cs typeface="Produkt Extralight"/>
                 <a:sym typeface="Produkt Extralight"/>
               </a:defRPr>
             </a:lvl1pPr>
-            <a:lvl2pPr marL="0" indent="457200" defTabSz="825500">
-              <a:spcBef>
-                <a:spcPts val="0"/>
-              </a:spcBef>
-              <a:buSzTx/>
-              <a:buNone/>
-              <a:defRPr sz="5500">
-                <a:latin typeface="+mn-lt"/>
-                <a:ea typeface="+mn-ea"/>
-                <a:cs typeface="+mn-cs"/>
-                <a:sym typeface="Produkt Extralight"/>
-              </a:defRPr>
-            </a:lvl2pPr>
-            <a:lvl3pPr marL="0" indent="914400" defTabSz="825500">
-              <a:spcBef>
-                <a:spcPts val="0"/>
-              </a:spcBef>
-              <a:buSzTx/>
-              <a:buNone/>
-              <a:defRPr sz="5500">
-                <a:latin typeface="+mn-lt"/>
-                <a:ea typeface="+mn-ea"/>
-                <a:cs typeface="+mn-cs"/>
-                <a:sym typeface="Produkt Extralight"/>
-              </a:defRPr>
-            </a:lvl3pPr>
-            <a:lvl4pPr marL="0" indent="1371600" defTabSz="825500">
-              <a:spcBef>
-                <a:spcPts val="0"/>
-              </a:spcBef>
-              <a:buSzTx/>
-              <a:buNone/>
-              <a:defRPr sz="5500">
-                <a:latin typeface="+mn-lt"/>
-                <a:ea typeface="+mn-ea"/>
-                <a:cs typeface="+mn-cs"/>
-                <a:sym typeface="Produkt Extralight"/>
-              </a:defRPr>
-            </a:lvl4pPr>
-            <a:lvl5pPr marL="0" indent="1828800" defTabSz="825500">
-              <a:spcBef>
-                <a:spcPts val="0"/>
-              </a:spcBef>
-              <a:buSzTx/>
-              <a:buNone/>
-              <a:defRPr sz="5500">
-                <a:latin typeface="+mn-lt"/>
-                <a:ea typeface="+mn-ea"/>
-                <a:cs typeface="+mn-cs"/>
-                <a:sym typeface="Produkt Extralight"/>
-              </a:defRPr>
-            </a:lvl5pPr>
           </a:lstStyle>
           <a:p>
             <a:pPr/>
             <a:r>
               <a:t>Presentation Subtitle</a:t>
-            </a:r>
-          </a:p>
-          <a:p>
-            <a:pPr lvl="1"/>
-            <a:r>
-              <a:t/>
-            </a:r>
-          </a:p>
-          <a:p>
-            <a:pPr lvl="2"/>
-            <a:r>
-              <a:t/>
-            </a:r>
-          </a:p>
-          <a:p>
-            <a:pPr lvl="3"/>
-            <a:r>
-              <a:t/>
-            </a:r>
-          </a:p>
-          <a:p>
-            <a:pPr lvl="4"/>
-            <a:r>
-              <a:t/>
             </a:r>
           </a:p>
         </p:txBody>
@@ -2167,7 +2239,7 @@
         <p:spPr>
           <a:xfrm>
             <a:off x="1206500" y="2611945"/>
-            <a:ext cx="21971000" cy="4648201"/>
+            <a:ext cx="21971000" cy="4648202"/>
           </a:xfrm>
           <a:prstGeom prst="rect">
             <a:avLst/>
@@ -2246,8 +2318,8 @@
         </p:nvSpPr>
         <p:spPr>
           <a:xfrm>
-            <a:off x="5707496" y="-660400"/>
-            <a:ext cx="20053301" cy="15042092"/>
+            <a:off x="5707495" y="-660400"/>
+            <a:ext cx="20053303" cy="15042093"/>
           </a:xfrm>
           <a:prstGeom prst="rect">
             <a:avLst/>
@@ -2274,7 +2346,7 @@
         <p:spPr>
           <a:xfrm>
             <a:off x="1206500" y="1333500"/>
-            <a:ext cx="9779000" cy="5882273"/>
+            <a:ext cx="9779000" cy="5882274"/>
           </a:xfrm>
           <a:prstGeom prst="rect">
             <a:avLst/>
@@ -2318,61 +2390,61 @@
               <a:buSzTx/>
               <a:buNone/>
               <a:defRPr sz="5500">
-                <a:latin typeface="+mn-lt"/>
-                <a:ea typeface="+mn-ea"/>
-                <a:cs typeface="+mn-cs"/>
+                <a:latin typeface="Produkt Extralight"/>
+                <a:ea typeface="Produkt Extralight"/>
+                <a:cs typeface="Produkt Extralight"/>
                 <a:sym typeface="Produkt Extralight"/>
               </a:defRPr>
             </a:lvl1pPr>
-            <a:lvl2pPr marL="0" indent="457200" defTabSz="825500">
+            <a:lvl2pPr marL="0" indent="0" defTabSz="825500">
               <a:spcBef>
                 <a:spcPts val="0"/>
               </a:spcBef>
               <a:buSzTx/>
               <a:buNone/>
               <a:defRPr sz="5500">
-                <a:latin typeface="+mn-lt"/>
-                <a:ea typeface="+mn-ea"/>
-                <a:cs typeface="+mn-cs"/>
+                <a:latin typeface="Produkt Extralight"/>
+                <a:ea typeface="Produkt Extralight"/>
+                <a:cs typeface="Produkt Extralight"/>
                 <a:sym typeface="Produkt Extralight"/>
               </a:defRPr>
             </a:lvl2pPr>
-            <a:lvl3pPr marL="0" indent="914400" defTabSz="825500">
+            <a:lvl3pPr marL="0" indent="0" defTabSz="825500">
               <a:spcBef>
                 <a:spcPts val="0"/>
               </a:spcBef>
               <a:buSzTx/>
               <a:buNone/>
               <a:defRPr sz="5500">
-                <a:latin typeface="+mn-lt"/>
-                <a:ea typeface="+mn-ea"/>
-                <a:cs typeface="+mn-cs"/>
+                <a:latin typeface="Produkt Extralight"/>
+                <a:ea typeface="Produkt Extralight"/>
+                <a:cs typeface="Produkt Extralight"/>
                 <a:sym typeface="Produkt Extralight"/>
               </a:defRPr>
             </a:lvl3pPr>
-            <a:lvl4pPr marL="0" indent="1371600" defTabSz="825500">
+            <a:lvl4pPr marL="0" indent="0" defTabSz="825500">
               <a:spcBef>
                 <a:spcPts val="0"/>
               </a:spcBef>
               <a:buSzTx/>
               <a:buNone/>
               <a:defRPr sz="5500">
-                <a:latin typeface="+mn-lt"/>
-                <a:ea typeface="+mn-ea"/>
-                <a:cs typeface="+mn-cs"/>
+                <a:latin typeface="Produkt Extralight"/>
+                <a:ea typeface="Produkt Extralight"/>
+                <a:cs typeface="Produkt Extralight"/>
                 <a:sym typeface="Produkt Extralight"/>
               </a:defRPr>
             </a:lvl4pPr>
-            <a:lvl5pPr marL="0" indent="1828800" defTabSz="825500">
+            <a:lvl5pPr marL="0" indent="0" defTabSz="825500">
               <a:spcBef>
                 <a:spcPts val="0"/>
               </a:spcBef>
               <a:buSzTx/>
               <a:buNone/>
               <a:defRPr sz="5500">
-                <a:latin typeface="+mn-lt"/>
-                <a:ea typeface="+mn-ea"/>
-                <a:cs typeface="+mn-cs"/>
+                <a:latin typeface="Produkt Extralight"/>
+                <a:ea typeface="Produkt Extralight"/>
+                <a:cs typeface="Produkt Extralight"/>
                 <a:sym typeface="Produkt Extralight"/>
               </a:defRPr>
             </a:lvl5pPr>
@@ -2466,6 +2538,10 @@
           </p:nvPr>
         </p:nvSpPr>
         <p:spPr>
+          <a:xfrm>
+            <a:off x="1206500" y="635000"/>
+            <a:ext cx="21971000" cy="1689100"/>
+          </a:xfrm>
           <a:prstGeom prst="rect">
             <a:avLst/>
           </a:prstGeom>
@@ -2483,10 +2559,10 @@
       </p:sp>
       <p:sp>
         <p:nvSpPr>
-          <p:cNvPr id="43" name="Slide Subtitle"/>
+          <p:cNvPr id="43" name="Body Level One…"/>
           <p:cNvSpPr txBox="1"/>
           <p:nvPr>
-            <p:ph type="body" sz="quarter" idx="21" hasCustomPrompt="1"/>
+            <p:ph type="body" sz="quarter" idx="1" hasCustomPrompt="1"/>
           </p:nvPr>
         </p:nvSpPr>
         <p:spPr>
@@ -2499,7 +2575,7 @@
           </a:prstGeom>
         </p:spPr>
         <p:txBody>
-          <a:bodyPr lIns="45719" tIns="45719" rIns="45719" bIns="45719"/>
+          <a:bodyPr lIns="45718" tIns="45718" rIns="45718" bIns="45718"/>
           <a:lstStyle>
             <a:lvl1pPr marL="0" indent="0" defTabSz="825500">
               <a:spcBef>
@@ -2508,17 +2584,85 @@
               <a:buSzTx/>
               <a:buNone/>
               <a:defRPr sz="5500">
-                <a:latin typeface="+mn-lt"/>
-                <a:ea typeface="+mn-ea"/>
-                <a:cs typeface="+mn-cs"/>
+                <a:latin typeface="Produkt Extralight"/>
+                <a:ea typeface="Produkt Extralight"/>
+                <a:cs typeface="Produkt Extralight"/>
                 <a:sym typeface="Produkt Extralight"/>
               </a:defRPr>
             </a:lvl1pPr>
+            <a:lvl2pPr marL="1085850" indent="-628650" defTabSz="825500">
+              <a:spcBef>
+                <a:spcPts val="0"/>
+              </a:spcBef>
+              <a:defRPr sz="5500">
+                <a:latin typeface="Produkt Extralight"/>
+                <a:ea typeface="Produkt Extralight"/>
+                <a:cs typeface="Produkt Extralight"/>
+                <a:sym typeface="Produkt Extralight"/>
+              </a:defRPr>
+            </a:lvl2pPr>
+            <a:lvl3pPr marL="1543050" indent="-628650" defTabSz="825500">
+              <a:spcBef>
+                <a:spcPts val="0"/>
+              </a:spcBef>
+              <a:defRPr sz="5500">
+                <a:latin typeface="Produkt Extralight"/>
+                <a:ea typeface="Produkt Extralight"/>
+                <a:cs typeface="Produkt Extralight"/>
+                <a:sym typeface="Produkt Extralight"/>
+              </a:defRPr>
+            </a:lvl3pPr>
+            <a:lvl4pPr marL="2000250" indent="-628650" defTabSz="825500">
+              <a:spcBef>
+                <a:spcPts val="0"/>
+              </a:spcBef>
+              <a:defRPr sz="5500">
+                <a:latin typeface="Produkt Extralight"/>
+                <a:ea typeface="Produkt Extralight"/>
+                <a:cs typeface="Produkt Extralight"/>
+                <a:sym typeface="Produkt Extralight"/>
+              </a:defRPr>
+            </a:lvl4pPr>
+            <a:lvl5pPr marL="2457450" indent="-628650" defTabSz="825500">
+              <a:spcBef>
+                <a:spcPts val="0"/>
+              </a:spcBef>
+              <a:defRPr sz="5500">
+                <a:latin typeface="Produkt Extralight"/>
+                <a:ea typeface="Produkt Extralight"/>
+                <a:cs typeface="Produkt Extralight"/>
+                <a:sym typeface="Produkt Extralight"/>
+              </a:defRPr>
+            </a:lvl5pPr>
           </a:lstStyle>
           <a:p>
             <a:pPr/>
             <a:r>
               <a:t>Slide Subtitle</a:t>
+            </a:r>
+          </a:p>
+          <a:p>
+            <a:pPr lvl="1"/>
+            <a:r>
+              <a:t/>
+            </a:r>
+          </a:p>
+          <a:p>
+            <a:pPr lvl="2"/>
+            <a:r>
+              <a:t/>
+            </a:r>
+          </a:p>
+          <a:p>
+            <a:pPr lvl="3"/>
+            <a:r>
+              <a:t/>
+            </a:r>
+          </a:p>
+          <a:p>
+            <a:pPr lvl="4"/>
+            <a:r>
+              <a:t/>
             </a:r>
           </a:p>
         </p:txBody>
@@ -2528,10 +2672,14 @@
           <p:cNvPr id="44" name="Body Level One…"/>
           <p:cNvSpPr txBox="1"/>
           <p:nvPr>
-            <p:ph type="body" idx="1" hasCustomPrompt="1"/>
+            <p:ph type="body" idx="21" hasCustomPrompt="1"/>
           </p:nvPr>
         </p:nvSpPr>
         <p:spPr>
+          <a:xfrm>
+            <a:off x="1206500" y="4260641"/>
+            <a:ext cx="21971000" cy="8256014"/>
+          </a:xfrm>
           <a:prstGeom prst="rect">
             <a:avLst/>
           </a:prstGeom>
@@ -2543,30 +2691,6 @@
             <a:pPr/>
             <a:r>
               <a:t>Slide bullet text</a:t>
-            </a:r>
-          </a:p>
-          <a:p>
-            <a:pPr lvl="1"/>
-            <a:r>
-              <a:t/>
-            </a:r>
-          </a:p>
-          <a:p>
-            <a:pPr lvl="2"/>
-            <a:r>
-              <a:t/>
-            </a:r>
-          </a:p>
-          <a:p>
-            <a:pPr lvl="3"/>
-            <a:r>
-              <a:t/>
-            </a:r>
-          </a:p>
-          <a:p>
-            <a:pPr lvl="4"/>
-            <a:r>
-              <a:t/>
             </a:r>
           </a:p>
         </p:txBody>
@@ -2717,10 +2841,10 @@
       </p:grpSpPr>
       <p:sp>
         <p:nvSpPr>
-          <p:cNvPr id="60" name="Slide Subtitle"/>
+          <p:cNvPr id="60" name="Body Level One…"/>
           <p:cNvSpPr txBox="1"/>
           <p:nvPr>
-            <p:ph type="body" sz="quarter" idx="21" hasCustomPrompt="1"/>
+            <p:ph type="body" sz="quarter" idx="1" hasCustomPrompt="1"/>
           </p:nvPr>
         </p:nvSpPr>
         <p:spPr>
@@ -2733,7 +2857,7 @@
           </a:prstGeom>
         </p:spPr>
         <p:txBody>
-          <a:bodyPr lIns="45719" tIns="45719" rIns="45719" bIns="45719"/>
+          <a:bodyPr lIns="45718" tIns="45718" rIns="45718" bIns="45718"/>
           <a:lstStyle>
             <a:lvl1pPr marL="0" indent="0" defTabSz="825500">
               <a:spcBef>
@@ -2742,17 +2866,85 @@
               <a:buSzTx/>
               <a:buNone/>
               <a:defRPr sz="5500">
-                <a:latin typeface="+mn-lt"/>
-                <a:ea typeface="+mn-ea"/>
-                <a:cs typeface="+mn-cs"/>
+                <a:latin typeface="Produkt Extralight"/>
+                <a:ea typeface="Produkt Extralight"/>
+                <a:cs typeface="Produkt Extralight"/>
                 <a:sym typeface="Produkt Extralight"/>
               </a:defRPr>
             </a:lvl1pPr>
+            <a:lvl2pPr marL="1085850" indent="-628650" defTabSz="825500">
+              <a:spcBef>
+                <a:spcPts val="0"/>
+              </a:spcBef>
+              <a:defRPr sz="5500">
+                <a:latin typeface="Produkt Extralight"/>
+                <a:ea typeface="Produkt Extralight"/>
+                <a:cs typeface="Produkt Extralight"/>
+                <a:sym typeface="Produkt Extralight"/>
+              </a:defRPr>
+            </a:lvl2pPr>
+            <a:lvl3pPr marL="1543050" indent="-628650" defTabSz="825500">
+              <a:spcBef>
+                <a:spcPts val="0"/>
+              </a:spcBef>
+              <a:defRPr sz="5500">
+                <a:latin typeface="Produkt Extralight"/>
+                <a:ea typeface="Produkt Extralight"/>
+                <a:cs typeface="Produkt Extralight"/>
+                <a:sym typeface="Produkt Extralight"/>
+              </a:defRPr>
+            </a:lvl3pPr>
+            <a:lvl4pPr marL="2000250" indent="-628650" defTabSz="825500">
+              <a:spcBef>
+                <a:spcPts val="0"/>
+              </a:spcBef>
+              <a:defRPr sz="5500">
+                <a:latin typeface="Produkt Extralight"/>
+                <a:ea typeface="Produkt Extralight"/>
+                <a:cs typeface="Produkt Extralight"/>
+                <a:sym typeface="Produkt Extralight"/>
+              </a:defRPr>
+            </a:lvl4pPr>
+            <a:lvl5pPr marL="2457450" indent="-628650" defTabSz="825500">
+              <a:spcBef>
+                <a:spcPts val="0"/>
+              </a:spcBef>
+              <a:defRPr sz="5500">
+                <a:latin typeface="Produkt Extralight"/>
+                <a:ea typeface="Produkt Extralight"/>
+                <a:cs typeface="Produkt Extralight"/>
+                <a:sym typeface="Produkt Extralight"/>
+              </a:defRPr>
+            </a:lvl5pPr>
           </a:lstStyle>
           <a:p>
             <a:pPr/>
             <a:r>
               <a:t>Slide Subtitle</a:t>
+            </a:r>
+          </a:p>
+          <a:p>
+            <a:pPr lvl="1"/>
+            <a:r>
+              <a:t/>
+            </a:r>
+          </a:p>
+          <a:p>
+            <a:pPr lvl="2"/>
+            <a:r>
+              <a:t/>
+            </a:r>
+          </a:p>
+          <a:p>
+            <a:pPr lvl="3"/>
+            <a:r>
+              <a:t/>
+            </a:r>
+          </a:p>
+          <a:p>
+            <a:pPr lvl="4"/>
+            <a:r>
+              <a:t/>
             </a:r>
           </a:p>
         </p:txBody>
@@ -2762,13 +2954,13 @@
           <p:cNvPr id="61" name="Angular stone architecture in light and shadow"/>
           <p:cNvSpPr/>
           <p:nvPr>
-            <p:ph type="pic" idx="22"/>
+            <p:ph type="pic" idx="21"/>
           </p:nvPr>
         </p:nvSpPr>
         <p:spPr>
           <a:xfrm>
             <a:off x="12382500" y="0"/>
-            <a:ext cx="21945600" cy="13716001"/>
+            <a:ext cx="21945600" cy="13716002"/>
           </a:xfrm>
           <a:prstGeom prst="rect">
             <a:avLst/>
@@ -2817,13 +3009,13 @@
           <p:cNvPr id="63" name="Body Level One…"/>
           <p:cNvSpPr txBox="1"/>
           <p:nvPr>
-            <p:ph type="body" sz="half" idx="1" hasCustomPrompt="1"/>
+            <p:ph type="body" sz="half" idx="22" hasCustomPrompt="1"/>
           </p:nvPr>
         </p:nvSpPr>
         <p:spPr>
           <a:xfrm>
-            <a:off x="1206500" y="4248504"/>
-            <a:ext cx="9779000" cy="8256630"/>
+            <a:off x="1206500" y="4248503"/>
+            <a:ext cx="9779000" cy="8256631"/>
           </a:xfrm>
           <a:prstGeom prst="rect">
             <a:avLst/>
@@ -2836,30 +3028,6 @@
             <a:pPr/>
             <a:r>
               <a:t>Slide bullet text</a:t>
-            </a:r>
-          </a:p>
-          <a:p>
-            <a:pPr lvl="1"/>
-            <a:r>
-              <a:t/>
-            </a:r>
-          </a:p>
-          <a:p>
-            <a:pPr lvl="2"/>
-            <a:r>
-              <a:t/>
-            </a:r>
-          </a:p>
-          <a:p>
-            <a:pPr lvl="3"/>
-            <a:r>
-              <a:t/>
-            </a:r>
-          </a:p>
-          <a:p>
-            <a:pPr lvl="4"/>
-            <a:r>
-              <a:t/>
             </a:r>
           </a:p>
         </p:txBody>
@@ -2926,10 +3094,10 @@
       </p:grpSpPr>
       <p:sp>
         <p:nvSpPr>
-          <p:cNvPr id="71" name="Slide Subtitle"/>
+          <p:cNvPr id="71" name="Body Level One…"/>
           <p:cNvSpPr txBox="1"/>
           <p:nvPr>
-            <p:ph type="body" sz="quarter" idx="21" hasCustomPrompt="1"/>
+            <p:ph type="body" sz="quarter" idx="1" hasCustomPrompt="1"/>
           </p:nvPr>
         </p:nvSpPr>
         <p:spPr>
@@ -2942,7 +3110,7 @@
           </a:prstGeom>
         </p:spPr>
         <p:txBody>
-          <a:bodyPr lIns="45719" tIns="45719" rIns="45719" bIns="45719"/>
+          <a:bodyPr lIns="45718" tIns="45718" rIns="45718" bIns="45718"/>
           <a:lstStyle>
             <a:lvl1pPr marL="0" indent="0" defTabSz="825500">
               <a:spcBef>
@@ -2951,17 +3119,85 @@
               <a:buSzTx/>
               <a:buNone/>
               <a:defRPr sz="5500">
-                <a:latin typeface="+mn-lt"/>
-                <a:ea typeface="+mn-ea"/>
-                <a:cs typeface="+mn-cs"/>
+                <a:latin typeface="Produkt Extralight"/>
+                <a:ea typeface="Produkt Extralight"/>
+                <a:cs typeface="Produkt Extralight"/>
                 <a:sym typeface="Produkt Extralight"/>
               </a:defRPr>
             </a:lvl1pPr>
+            <a:lvl2pPr marL="1085850" indent="-628650" defTabSz="825500">
+              <a:spcBef>
+                <a:spcPts val="0"/>
+              </a:spcBef>
+              <a:defRPr sz="5500">
+                <a:latin typeface="Produkt Extralight"/>
+                <a:ea typeface="Produkt Extralight"/>
+                <a:cs typeface="Produkt Extralight"/>
+                <a:sym typeface="Produkt Extralight"/>
+              </a:defRPr>
+            </a:lvl2pPr>
+            <a:lvl3pPr marL="1543050" indent="-628650" defTabSz="825500">
+              <a:spcBef>
+                <a:spcPts val="0"/>
+              </a:spcBef>
+              <a:defRPr sz="5500">
+                <a:latin typeface="Produkt Extralight"/>
+                <a:ea typeface="Produkt Extralight"/>
+                <a:cs typeface="Produkt Extralight"/>
+                <a:sym typeface="Produkt Extralight"/>
+              </a:defRPr>
+            </a:lvl3pPr>
+            <a:lvl4pPr marL="2000250" indent="-628650" defTabSz="825500">
+              <a:spcBef>
+                <a:spcPts val="0"/>
+              </a:spcBef>
+              <a:defRPr sz="5500">
+                <a:latin typeface="Produkt Extralight"/>
+                <a:ea typeface="Produkt Extralight"/>
+                <a:cs typeface="Produkt Extralight"/>
+                <a:sym typeface="Produkt Extralight"/>
+              </a:defRPr>
+            </a:lvl4pPr>
+            <a:lvl5pPr marL="2457450" indent="-628650" defTabSz="825500">
+              <a:spcBef>
+                <a:spcPts val="0"/>
+              </a:spcBef>
+              <a:defRPr sz="5500">
+                <a:latin typeface="Produkt Extralight"/>
+                <a:ea typeface="Produkt Extralight"/>
+                <a:cs typeface="Produkt Extralight"/>
+                <a:sym typeface="Produkt Extralight"/>
+              </a:defRPr>
+            </a:lvl5pPr>
           </a:lstStyle>
           <a:p>
             <a:pPr/>
             <a:r>
               <a:t>Slide Subtitle</a:t>
+            </a:r>
+          </a:p>
+          <a:p>
+            <a:pPr lvl="1"/>
+            <a:r>
+              <a:t/>
+            </a:r>
+          </a:p>
+          <a:p>
+            <a:pPr lvl="2"/>
+            <a:r>
+              <a:t/>
+            </a:r>
+          </a:p>
+          <a:p>
+            <a:pPr lvl="3"/>
+            <a:r>
+              <a:t/>
+            </a:r>
+          </a:p>
+          <a:p>
+            <a:pPr lvl="4"/>
+            <a:r>
+              <a:t/>
             </a:r>
           </a:p>
         </p:txBody>
@@ -2975,6 +3211,10 @@
           </p:nvPr>
         </p:nvSpPr>
         <p:spPr>
+          <a:xfrm>
+            <a:off x="1206500" y="635000"/>
+            <a:ext cx="21971000" cy="1689100"/>
+          </a:xfrm>
           <a:prstGeom prst="rect">
             <a:avLst/>
           </a:prstGeom>
@@ -2995,13 +3235,13 @@
           <p:cNvPr id="73" name="Body Level One…"/>
           <p:cNvSpPr txBox="1"/>
           <p:nvPr>
-            <p:ph type="body" sz="half" idx="1" hasCustomPrompt="1"/>
+            <p:ph type="body" sz="half" idx="21" hasCustomPrompt="1"/>
           </p:nvPr>
         </p:nvSpPr>
         <p:spPr>
           <a:xfrm>
-            <a:off x="1206500" y="4248504"/>
-            <a:ext cx="9779000" cy="8256630"/>
+            <a:off x="1206500" y="4248503"/>
+            <a:ext cx="9779000" cy="8256631"/>
           </a:xfrm>
           <a:prstGeom prst="rect">
             <a:avLst/>
@@ -3014,30 +3254,6 @@
             <a:pPr/>
             <a:r>
               <a:t>Slide bullet text</a:t>
-            </a:r>
-          </a:p>
-          <a:p>
-            <a:pPr lvl="1"/>
-            <a:r>
-              <a:t/>
-            </a:r>
-          </a:p>
-          <a:p>
-            <a:pPr lvl="2"/>
-            <a:r>
-              <a:t/>
-            </a:r>
-          </a:p>
-          <a:p>
-            <a:pPr lvl="3"/>
-            <a:r>
-              <a:t/>
-            </a:r>
-          </a:p>
-          <a:p>
-            <a:pPr lvl="4"/>
-            <a:r>
-              <a:t/>
             </a:r>
           </a:p>
         </p:txBody>
@@ -3092,10 +3308,10 @@
       </p:grpSpPr>
       <p:sp>
         <p:nvSpPr>
-          <p:cNvPr id="81" name="Slide Subtitle"/>
+          <p:cNvPr id="81" name="Body Level One…"/>
           <p:cNvSpPr txBox="1"/>
           <p:nvPr>
-            <p:ph type="body" sz="quarter" idx="21" hasCustomPrompt="1"/>
+            <p:ph type="body" sz="quarter" idx="1" hasCustomPrompt="1"/>
           </p:nvPr>
         </p:nvSpPr>
         <p:spPr>
@@ -3108,7 +3324,7 @@
           </a:prstGeom>
         </p:spPr>
         <p:txBody>
-          <a:bodyPr lIns="45719" tIns="45719" rIns="45719" bIns="45719"/>
+          <a:bodyPr lIns="45718" tIns="45718" rIns="45718" bIns="45718"/>
           <a:lstStyle>
             <a:lvl1pPr marL="0" indent="0" defTabSz="825500">
               <a:spcBef>
@@ -3117,17 +3333,85 @@
               <a:buSzTx/>
               <a:buNone/>
               <a:defRPr sz="5500">
-                <a:latin typeface="+mn-lt"/>
-                <a:ea typeface="+mn-ea"/>
-                <a:cs typeface="+mn-cs"/>
+                <a:latin typeface="Produkt Extralight"/>
+                <a:ea typeface="Produkt Extralight"/>
+                <a:cs typeface="Produkt Extralight"/>
                 <a:sym typeface="Produkt Extralight"/>
               </a:defRPr>
             </a:lvl1pPr>
+            <a:lvl2pPr marL="1085850" indent="-628650" defTabSz="825500">
+              <a:spcBef>
+                <a:spcPts val="0"/>
+              </a:spcBef>
+              <a:defRPr sz="5500">
+                <a:latin typeface="Produkt Extralight"/>
+                <a:ea typeface="Produkt Extralight"/>
+                <a:cs typeface="Produkt Extralight"/>
+                <a:sym typeface="Produkt Extralight"/>
+              </a:defRPr>
+            </a:lvl2pPr>
+            <a:lvl3pPr marL="1543050" indent="-628650" defTabSz="825500">
+              <a:spcBef>
+                <a:spcPts val="0"/>
+              </a:spcBef>
+              <a:defRPr sz="5500">
+                <a:latin typeface="Produkt Extralight"/>
+                <a:ea typeface="Produkt Extralight"/>
+                <a:cs typeface="Produkt Extralight"/>
+                <a:sym typeface="Produkt Extralight"/>
+              </a:defRPr>
+            </a:lvl3pPr>
+            <a:lvl4pPr marL="2000250" indent="-628650" defTabSz="825500">
+              <a:spcBef>
+                <a:spcPts val="0"/>
+              </a:spcBef>
+              <a:defRPr sz="5500">
+                <a:latin typeface="Produkt Extralight"/>
+                <a:ea typeface="Produkt Extralight"/>
+                <a:cs typeface="Produkt Extralight"/>
+                <a:sym typeface="Produkt Extralight"/>
+              </a:defRPr>
+            </a:lvl4pPr>
+            <a:lvl5pPr marL="2457450" indent="-628650" defTabSz="825500">
+              <a:spcBef>
+                <a:spcPts val="0"/>
+              </a:spcBef>
+              <a:defRPr sz="5500">
+                <a:latin typeface="Produkt Extralight"/>
+                <a:ea typeface="Produkt Extralight"/>
+                <a:cs typeface="Produkt Extralight"/>
+                <a:sym typeface="Produkt Extralight"/>
+              </a:defRPr>
+            </a:lvl5pPr>
           </a:lstStyle>
           <a:p>
             <a:pPr/>
             <a:r>
               <a:t>Slide Subtitle</a:t>
+            </a:r>
+          </a:p>
+          <a:p>
+            <a:pPr lvl="1"/>
+            <a:r>
+              <a:t/>
+            </a:r>
+          </a:p>
+          <a:p>
+            <a:pPr lvl="2"/>
+            <a:r>
+              <a:t/>
+            </a:r>
+          </a:p>
+          <a:p>
+            <a:pPr lvl="3"/>
+            <a:r>
+              <a:t/>
+            </a:r>
+          </a:p>
+          <a:p>
+            <a:pPr lvl="4"/>
+            <a:r>
+              <a:t/>
             </a:r>
           </a:p>
         </p:txBody>
@@ -3165,13 +3449,13 @@
           <p:cNvPr id="83" name="Body Level One…"/>
           <p:cNvSpPr txBox="1"/>
           <p:nvPr>
-            <p:ph type="body" sz="half" idx="1" hasCustomPrompt="1"/>
+            <p:ph type="body" sz="half" idx="21" hasCustomPrompt="1"/>
           </p:nvPr>
         </p:nvSpPr>
         <p:spPr>
           <a:xfrm>
-            <a:off x="1206500" y="4248504"/>
-            <a:ext cx="9779000" cy="8256630"/>
+            <a:off x="1206500" y="4248503"/>
+            <a:ext cx="9779000" cy="8256631"/>
           </a:xfrm>
           <a:prstGeom prst="rect">
             <a:avLst/>
@@ -3184,30 +3468,6 @@
             <a:pPr/>
             <a:r>
               <a:t>Slide bullet text</a:t>
-            </a:r>
-          </a:p>
-          <a:p>
-            <a:pPr lvl="1"/>
-            <a:r>
-              <a:t/>
-            </a:r>
-          </a:p>
-          <a:p>
-            <a:pPr lvl="2"/>
-            <a:r>
-              <a:t/>
-            </a:r>
-          </a:p>
-          <a:p>
-            <a:pPr lvl="3"/>
-            <a:r>
-              <a:t/>
-            </a:r>
-          </a:p>
-          <a:p>
-            <a:pPr lvl="4"/>
-            <a:r>
-              <a:t/>
             </a:r>
           </a:p>
         </p:txBody>
@@ -3271,7 +3531,7 @@
         <p:spPr>
           <a:xfrm>
             <a:off x="1206500" y="3906899"/>
-            <a:ext cx="21971004" cy="4648201"/>
+            <a:ext cx="21971005" cy="4648202"/>
           </a:xfrm>
           <a:prstGeom prst="rect">
             <a:avLst/>
@@ -3349,16 +3609,16 @@
       </p:grpSpPr>
       <p:sp>
         <p:nvSpPr>
-          <p:cNvPr id="2" name="Slide Title"/>
+          <p:cNvPr id="2" name="Body Level One…"/>
           <p:cNvSpPr txBox="1"/>
           <p:nvPr>
-            <p:ph type="title" hasCustomPrompt="1"/>
+            <p:ph type="body" idx="1" hasCustomPrompt="1"/>
           </p:nvPr>
         </p:nvSpPr>
         <p:spPr>
           <a:xfrm>
-            <a:off x="1206500" y="635000"/>
-            <a:ext cx="21971000" cy="1689100"/>
+            <a:off x="1206500" y="4260641"/>
+            <a:ext cx="21971000" cy="8256014"/>
           </a:xfrm>
           <a:prstGeom prst="rect">
             <a:avLst/>
@@ -3380,23 +3640,47 @@
           <a:p>
             <a:pPr/>
             <a:r>
-              <a:t>Slide Title</a:t>
-            </a:r>
-          </a:p>
-        </p:txBody>
-      </p:sp>
-      <p:sp>
-        <p:nvSpPr>
-          <p:cNvPr id="3" name="Body Level One…"/>
+              <a:t>Slide bullet text</a:t>
+            </a:r>
+          </a:p>
+          <a:p>
+            <a:pPr lvl="1"/>
+            <a:r>
+              <a:t/>
+            </a:r>
+          </a:p>
+          <a:p>
+            <a:pPr lvl="2"/>
+            <a:r>
+              <a:t/>
+            </a:r>
+          </a:p>
+          <a:p>
+            <a:pPr lvl="3"/>
+            <a:r>
+              <a:t/>
+            </a:r>
+          </a:p>
+          <a:p>
+            <a:pPr lvl="4"/>
+            <a:r>
+              <a:t/>
+            </a:r>
+          </a:p>
+        </p:txBody>
+      </p:sp>
+      <p:sp>
+        <p:nvSpPr>
+          <p:cNvPr id="3" name="Title Text"/>
           <p:cNvSpPr txBox="1"/>
           <p:nvPr>
-            <p:ph type="body" idx="1" hasCustomPrompt="1"/>
+            <p:ph type="title"/>
           </p:nvPr>
         </p:nvSpPr>
         <p:spPr>
           <a:xfrm>
-            <a:off x="1206500" y="4260642"/>
-            <a:ext cx="21971000" cy="8256012"/>
+            <a:off x="3653366" y="2743200"/>
+            <a:ext cx="19507201" cy="1517442"/>
           </a:xfrm>
           <a:prstGeom prst="rect">
             <a:avLst/>
@@ -3418,31 +3702,7 @@
           <a:p>
             <a:pPr/>
             <a:r>
-              <a:t>Slide bullet text</a:t>
-            </a:r>
-          </a:p>
-          <a:p>
-            <a:pPr lvl="1"/>
-            <a:r>
-              <a:t/>
-            </a:r>
-          </a:p>
-          <a:p>
-            <a:pPr lvl="2"/>
-            <a:r>
-              <a:t/>
-            </a:r>
-          </a:p>
-          <a:p>
-            <a:pPr lvl="3"/>
-            <a:r>
-              <a:t/>
-            </a:r>
-          </a:p>
-          <a:p>
-            <a:pPr lvl="4"/>
-            <a:r>
-              <a:t/>
+              <a:t>Title Text</a:t>
             </a:r>
           </a:p>
         </p:txBody>
@@ -3457,7 +3717,7 @@
         </p:nvSpPr>
         <p:spPr>
           <a:xfrm>
-            <a:off x="23558500" y="12458699"/>
+            <a:off x="23558500" y="12458700"/>
             <a:ext cx="388620" cy="429261"/>
           </a:xfrm>
           <a:prstGeom prst="rect">
@@ -3477,6 +3737,9 @@
                 <a:spcPts val="0"/>
               </a:spcBef>
               <a:defRPr sz="2000">
+                <a:solidFill>
+                  <a:srgbClr val="FFFFFF"/>
+                </a:solidFill>
                 <a:latin typeface="Graphik"/>
                 <a:ea typeface="Graphik"/>
                 <a:cs typeface="Graphik"/>
@@ -3492,7 +3755,7 @@
       </p:sp>
     </p:spTree>
   </p:cSld>
-  <p:clrMap bg1="dk1" tx1="lt1" bg2="dk2" tx2="lt2" accent1="accent1" accent2="accent2" accent3="accent3" accent4="accent4" accent5="accent5" accent6="accent6" hlink="hlink" folHlink="folHlink"/>
+  <p:clrMap bg1="lt1" tx1="dk1" bg2="lt2" tx2="dk2" accent1="accent1" accent2="accent2" accent3="accent3" accent4="accent4" accent5="accent5" accent6="accent6" hlink="hlink" folHlink="folHlink"/>
   <p:sldLayoutIdLst>
     <p:sldLayoutId id="2147483649" r:id="rId2"/>
     <p:sldLayoutId id="2147483650" r:id="rId3"/>
@@ -3515,7 +3778,7 @@
   <p:transition xmlns:p14="http://schemas.microsoft.com/office/powerpoint/2010/main" spd="med" advClick="1"/>
   <p:txStyles>
     <p:titleStyle>
-      <a:lvl1pPr marL="0" marR="0" indent="0" algn="l" defTabSz="2438338" rtl="0" latinLnBrk="0">
+      <a:lvl1pPr marL="0" marR="0" indent="0" algn="l" defTabSz="2438337" rtl="0" latinLnBrk="0">
         <a:lnSpc>
           <a:spcPct val="90000"/>
         </a:lnSpc>
@@ -3535,13 +3798,13 @@
             <a:srgbClr val="FFFFFF"/>
           </a:solidFill>
           <a:uFillTx/>
-          <a:latin typeface="+mn-lt"/>
-          <a:ea typeface="+mn-ea"/>
-          <a:cs typeface="+mn-cs"/>
+          <a:latin typeface="Produkt Extralight"/>
+          <a:ea typeface="Produkt Extralight"/>
+          <a:cs typeface="Produkt Extralight"/>
           <a:sym typeface="Produkt Extralight"/>
         </a:defRPr>
       </a:lvl1pPr>
-      <a:lvl2pPr marL="0" marR="0" indent="457200" algn="l" defTabSz="2438338" rtl="0" latinLnBrk="0">
+      <a:lvl2pPr marL="0" marR="0" indent="0" algn="l" defTabSz="2438337" rtl="0" latinLnBrk="0">
         <a:lnSpc>
           <a:spcPct val="90000"/>
         </a:lnSpc>
@@ -3561,13 +3824,13 @@
             <a:srgbClr val="FFFFFF"/>
           </a:solidFill>
           <a:uFillTx/>
-          <a:latin typeface="+mn-lt"/>
-          <a:ea typeface="+mn-ea"/>
-          <a:cs typeface="+mn-cs"/>
+          <a:latin typeface="Produkt Extralight"/>
+          <a:ea typeface="Produkt Extralight"/>
+          <a:cs typeface="Produkt Extralight"/>
           <a:sym typeface="Produkt Extralight"/>
         </a:defRPr>
       </a:lvl2pPr>
-      <a:lvl3pPr marL="0" marR="0" indent="914400" algn="l" defTabSz="2438338" rtl="0" latinLnBrk="0">
+      <a:lvl3pPr marL="0" marR="0" indent="0" algn="l" defTabSz="2438337" rtl="0" latinLnBrk="0">
         <a:lnSpc>
           <a:spcPct val="90000"/>
         </a:lnSpc>
@@ -3587,13 +3850,13 @@
             <a:srgbClr val="FFFFFF"/>
           </a:solidFill>
           <a:uFillTx/>
-          <a:latin typeface="+mn-lt"/>
-          <a:ea typeface="+mn-ea"/>
-          <a:cs typeface="+mn-cs"/>
+          <a:latin typeface="Produkt Extralight"/>
+          <a:ea typeface="Produkt Extralight"/>
+          <a:cs typeface="Produkt Extralight"/>
           <a:sym typeface="Produkt Extralight"/>
         </a:defRPr>
       </a:lvl3pPr>
-      <a:lvl4pPr marL="0" marR="0" indent="1371600" algn="l" defTabSz="2438338" rtl="0" latinLnBrk="0">
+      <a:lvl4pPr marL="0" marR="0" indent="0" algn="l" defTabSz="2438337" rtl="0" latinLnBrk="0">
         <a:lnSpc>
           <a:spcPct val="90000"/>
         </a:lnSpc>
@@ -3613,13 +3876,13 @@
             <a:srgbClr val="FFFFFF"/>
           </a:solidFill>
           <a:uFillTx/>
-          <a:latin typeface="+mn-lt"/>
-          <a:ea typeface="+mn-ea"/>
-          <a:cs typeface="+mn-cs"/>
+          <a:latin typeface="Produkt Extralight"/>
+          <a:ea typeface="Produkt Extralight"/>
+          <a:cs typeface="Produkt Extralight"/>
           <a:sym typeface="Produkt Extralight"/>
         </a:defRPr>
       </a:lvl4pPr>
-      <a:lvl5pPr marL="0" marR="0" indent="1828800" algn="l" defTabSz="2438338" rtl="0" latinLnBrk="0">
+      <a:lvl5pPr marL="0" marR="0" indent="0" algn="l" defTabSz="2438337" rtl="0" latinLnBrk="0">
         <a:lnSpc>
           <a:spcPct val="90000"/>
         </a:lnSpc>
@@ -3639,13 +3902,13 @@
             <a:srgbClr val="FFFFFF"/>
           </a:solidFill>
           <a:uFillTx/>
-          <a:latin typeface="+mn-lt"/>
-          <a:ea typeface="+mn-ea"/>
-          <a:cs typeface="+mn-cs"/>
+          <a:latin typeface="Produkt Extralight"/>
+          <a:ea typeface="Produkt Extralight"/>
+          <a:cs typeface="Produkt Extralight"/>
           <a:sym typeface="Produkt Extralight"/>
         </a:defRPr>
       </a:lvl5pPr>
-      <a:lvl6pPr marL="0" marR="0" indent="2286000" algn="l" defTabSz="2438338" rtl="0" latinLnBrk="0">
+      <a:lvl6pPr marL="0" marR="0" indent="0" algn="l" defTabSz="2438337" rtl="0" latinLnBrk="0">
         <a:lnSpc>
           <a:spcPct val="90000"/>
         </a:lnSpc>
@@ -3665,13 +3928,13 @@
             <a:srgbClr val="FFFFFF"/>
           </a:solidFill>
           <a:uFillTx/>
-          <a:latin typeface="+mn-lt"/>
-          <a:ea typeface="+mn-ea"/>
-          <a:cs typeface="+mn-cs"/>
+          <a:latin typeface="Produkt Extralight"/>
+          <a:ea typeface="Produkt Extralight"/>
+          <a:cs typeface="Produkt Extralight"/>
           <a:sym typeface="Produkt Extralight"/>
         </a:defRPr>
       </a:lvl6pPr>
-      <a:lvl7pPr marL="0" marR="0" indent="2743200" algn="l" defTabSz="2438338" rtl="0" latinLnBrk="0">
+      <a:lvl7pPr marL="0" marR="0" indent="0" algn="l" defTabSz="2438337" rtl="0" latinLnBrk="0">
         <a:lnSpc>
           <a:spcPct val="90000"/>
         </a:lnSpc>
@@ -3691,13 +3954,13 @@
             <a:srgbClr val="FFFFFF"/>
           </a:solidFill>
           <a:uFillTx/>
-          <a:latin typeface="+mn-lt"/>
-          <a:ea typeface="+mn-ea"/>
-          <a:cs typeface="+mn-cs"/>
+          <a:latin typeface="Produkt Extralight"/>
+          <a:ea typeface="Produkt Extralight"/>
+          <a:cs typeface="Produkt Extralight"/>
           <a:sym typeface="Produkt Extralight"/>
         </a:defRPr>
       </a:lvl7pPr>
-      <a:lvl8pPr marL="0" marR="0" indent="3200400" algn="l" defTabSz="2438338" rtl="0" latinLnBrk="0">
+      <a:lvl8pPr marL="0" marR="0" indent="0" algn="l" defTabSz="2438337" rtl="0" latinLnBrk="0">
         <a:lnSpc>
           <a:spcPct val="90000"/>
         </a:lnSpc>
@@ -3717,13 +3980,13 @@
             <a:srgbClr val="FFFFFF"/>
           </a:solidFill>
           <a:uFillTx/>
-          <a:latin typeface="+mn-lt"/>
-          <a:ea typeface="+mn-ea"/>
-          <a:cs typeface="+mn-cs"/>
+          <a:latin typeface="Produkt Extralight"/>
+          <a:ea typeface="Produkt Extralight"/>
+          <a:cs typeface="Produkt Extralight"/>
           <a:sym typeface="Produkt Extralight"/>
         </a:defRPr>
       </a:lvl8pPr>
-      <a:lvl9pPr marL="0" marR="0" indent="3657600" algn="l" defTabSz="2438338" rtl="0" latinLnBrk="0">
+      <a:lvl9pPr marL="0" marR="0" indent="0" algn="l" defTabSz="2438337" rtl="0" latinLnBrk="0">
         <a:lnSpc>
           <a:spcPct val="90000"/>
         </a:lnSpc>
@@ -3743,15 +4006,15 @@
             <a:srgbClr val="FFFFFF"/>
           </a:solidFill>
           <a:uFillTx/>
-          <a:latin typeface="+mn-lt"/>
-          <a:ea typeface="+mn-ea"/>
-          <a:cs typeface="+mn-cs"/>
+          <a:latin typeface="Produkt Extralight"/>
+          <a:ea typeface="Produkt Extralight"/>
+          <a:cs typeface="Produkt Extralight"/>
           <a:sym typeface="Produkt Extralight"/>
         </a:defRPr>
       </a:lvl9pPr>
     </p:titleStyle>
     <p:bodyStyle>
-      <a:lvl1pPr marL="457200" marR="0" indent="-457200" algn="l" defTabSz="2438338" rtl="0" latinLnBrk="0">
+      <a:lvl1pPr marL="457200" marR="0" indent="-457200" algn="l" defTabSz="2438337" rtl="0" latinLnBrk="0">
         <a:lnSpc>
           <a:spcPct val="100000"/>
         </a:lnSpc>
@@ -3777,7 +4040,7 @@
           <a:sym typeface="Graphik Light"/>
         </a:defRPr>
       </a:lvl1pPr>
-      <a:lvl2pPr marL="914400" marR="0" indent="-457200" algn="l" defTabSz="2438338" rtl="0" latinLnBrk="0">
+      <a:lvl2pPr marL="914400" marR="0" indent="-457200" algn="l" defTabSz="2438337" rtl="0" latinLnBrk="0">
         <a:lnSpc>
           <a:spcPct val="100000"/>
         </a:lnSpc>
@@ -3803,7 +4066,7 @@
           <a:sym typeface="Graphik Light"/>
         </a:defRPr>
       </a:lvl2pPr>
-      <a:lvl3pPr marL="1371600" marR="0" indent="-457200" algn="l" defTabSz="2438338" rtl="0" latinLnBrk="0">
+      <a:lvl3pPr marL="1371600" marR="0" indent="-457200" algn="l" defTabSz="2438337" rtl="0" latinLnBrk="0">
         <a:lnSpc>
           <a:spcPct val="100000"/>
         </a:lnSpc>
@@ -3829,7 +4092,7 @@
           <a:sym typeface="Graphik Light"/>
         </a:defRPr>
       </a:lvl3pPr>
-      <a:lvl4pPr marL="1828800" marR="0" indent="-457200" algn="l" defTabSz="2438338" rtl="0" latinLnBrk="0">
+      <a:lvl4pPr marL="1828800" marR="0" indent="-457200" algn="l" defTabSz="2438337" rtl="0" latinLnBrk="0">
         <a:lnSpc>
           <a:spcPct val="100000"/>
         </a:lnSpc>
@@ -3855,7 +4118,7 @@
           <a:sym typeface="Graphik Light"/>
         </a:defRPr>
       </a:lvl4pPr>
-      <a:lvl5pPr marL="2286000" marR="0" indent="-457200" algn="l" defTabSz="2438338" rtl="0" latinLnBrk="0">
+      <a:lvl5pPr marL="2286000" marR="0" indent="-457200" algn="l" defTabSz="2438337" rtl="0" latinLnBrk="0">
         <a:lnSpc>
           <a:spcPct val="100000"/>
         </a:lnSpc>
@@ -3881,7 +4144,7 @@
           <a:sym typeface="Graphik Light"/>
         </a:defRPr>
       </a:lvl5pPr>
-      <a:lvl6pPr marL="2743200" marR="0" indent="-457200" algn="l" defTabSz="2438338" rtl="0" latinLnBrk="0">
+      <a:lvl6pPr marL="2743200" marR="0" indent="-457200" algn="l" defTabSz="2438337" rtl="0" latinLnBrk="0">
         <a:lnSpc>
           <a:spcPct val="100000"/>
         </a:lnSpc>
@@ -3907,7 +4170,7 @@
           <a:sym typeface="Graphik Light"/>
         </a:defRPr>
       </a:lvl6pPr>
-      <a:lvl7pPr marL="3200400" marR="0" indent="-457200" algn="l" defTabSz="2438338" rtl="0" latinLnBrk="0">
+      <a:lvl7pPr marL="3200400" marR="0" indent="-457200" algn="l" defTabSz="2438337" rtl="0" latinLnBrk="0">
         <a:lnSpc>
           <a:spcPct val="100000"/>
         </a:lnSpc>
@@ -3933,7 +4196,7 @@
           <a:sym typeface="Graphik Light"/>
         </a:defRPr>
       </a:lvl7pPr>
-      <a:lvl8pPr marL="3657600" marR="0" indent="-457200" algn="l" defTabSz="2438338" rtl="0" latinLnBrk="0">
+      <a:lvl8pPr marL="3657600" marR="0" indent="-457200" algn="l" defTabSz="2438337" rtl="0" latinLnBrk="0">
         <a:lnSpc>
           <a:spcPct val="100000"/>
         </a:lnSpc>
@@ -3959,7 +4222,7 @@
           <a:sym typeface="Graphik Light"/>
         </a:defRPr>
       </a:lvl8pPr>
-      <a:lvl9pPr marL="4114800" marR="0" indent="-457200" algn="l" defTabSz="2438338" rtl="0" latinLnBrk="0">
+      <a:lvl9pPr marL="4114800" marR="0" indent="-457200" algn="l" defTabSz="2438337" rtl="0" latinLnBrk="0">
         <a:lnSpc>
           <a:spcPct val="100000"/>
         </a:lnSpc>
@@ -4013,7 +4276,7 @@
           <a:sym typeface="Graphik"/>
         </a:defRPr>
       </a:lvl1pPr>
-      <a:lvl2pPr marL="0" marR="0" indent="457200" algn="l" defTabSz="584200" rtl="0" latinLnBrk="0">
+      <a:lvl2pPr marL="0" marR="0" indent="0" algn="l" defTabSz="584200" rtl="0" latinLnBrk="0">
         <a:lnSpc>
           <a:spcPct val="100000"/>
         </a:lnSpc>
@@ -4039,7 +4302,7 @@
           <a:sym typeface="Graphik"/>
         </a:defRPr>
       </a:lvl2pPr>
-      <a:lvl3pPr marL="0" marR="0" indent="914400" algn="l" defTabSz="584200" rtl="0" latinLnBrk="0">
+      <a:lvl3pPr marL="0" marR="0" indent="0" algn="l" defTabSz="584200" rtl="0" latinLnBrk="0">
         <a:lnSpc>
           <a:spcPct val="100000"/>
         </a:lnSpc>
@@ -4065,7 +4328,7 @@
           <a:sym typeface="Graphik"/>
         </a:defRPr>
       </a:lvl3pPr>
-      <a:lvl4pPr marL="0" marR="0" indent="1371600" algn="l" defTabSz="584200" rtl="0" latinLnBrk="0">
+      <a:lvl4pPr marL="0" marR="0" indent="0" algn="l" defTabSz="584200" rtl="0" latinLnBrk="0">
         <a:lnSpc>
           <a:spcPct val="100000"/>
         </a:lnSpc>
@@ -4091,7 +4354,7 @@
           <a:sym typeface="Graphik"/>
         </a:defRPr>
       </a:lvl4pPr>
-      <a:lvl5pPr marL="0" marR="0" indent="1828800" algn="l" defTabSz="584200" rtl="0" latinLnBrk="0">
+      <a:lvl5pPr marL="0" marR="0" indent="0" algn="l" defTabSz="584200" rtl="0" latinLnBrk="0">
         <a:lnSpc>
           <a:spcPct val="100000"/>
         </a:lnSpc>
@@ -4117,7 +4380,7 @@
           <a:sym typeface="Graphik"/>
         </a:defRPr>
       </a:lvl5pPr>
-      <a:lvl6pPr marL="0" marR="0" indent="2286000" algn="l" defTabSz="584200" rtl="0" latinLnBrk="0">
+      <a:lvl6pPr marL="0" marR="0" indent="0" algn="l" defTabSz="584200" rtl="0" latinLnBrk="0">
         <a:lnSpc>
           <a:spcPct val="100000"/>
         </a:lnSpc>
@@ -4143,7 +4406,7 @@
           <a:sym typeface="Graphik"/>
         </a:defRPr>
       </a:lvl6pPr>
-      <a:lvl7pPr marL="0" marR="0" indent="2743200" algn="l" defTabSz="584200" rtl="0" latinLnBrk="0">
+      <a:lvl7pPr marL="0" marR="0" indent="0" algn="l" defTabSz="584200" rtl="0" latinLnBrk="0">
         <a:lnSpc>
           <a:spcPct val="100000"/>
         </a:lnSpc>
@@ -4169,7 +4432,7 @@
           <a:sym typeface="Graphik"/>
         </a:defRPr>
       </a:lvl7pPr>
-      <a:lvl8pPr marL="0" marR="0" indent="3200400" algn="l" defTabSz="584200" rtl="0" latinLnBrk="0">
+      <a:lvl8pPr marL="0" marR="0" indent="0" algn="l" defTabSz="584200" rtl="0" latinLnBrk="0">
         <a:lnSpc>
           <a:spcPct val="100000"/>
         </a:lnSpc>
@@ -4195,7 +4458,7 @@
           <a:sym typeface="Graphik"/>
         </a:defRPr>
       </a:lvl8pPr>
-      <a:lvl9pPr marL="0" marR="0" indent="3657600" algn="l" defTabSz="584200" rtl="0" latinLnBrk="0">
+      <a:lvl9pPr marL="0" marR="0" indent="0" algn="l" defTabSz="584200" rtl="0" latinLnBrk="0">
         <a:lnSpc>
           <a:spcPct val="100000"/>
         </a:lnSpc>
@@ -4248,13 +4511,46 @@
           <p:cNvPr id="171" name="Ryan Nesbitt"/>
           <p:cNvSpPr txBox="1"/>
           <p:nvPr>
-            <p:ph type="body" idx="21"/>
+            <p:ph type="body" sz="quarter" idx="1"/>
           </p:nvPr>
         </p:nvSpPr>
         <p:spPr>
-          <a:prstGeom prst="rect">
-            <a:avLst/>
-          </a:prstGeom>
+          <a:xfrm>
+            <a:off x="1206500" y="12268782"/>
+            <a:ext cx="21971000" cy="660402"/>
+          </a:xfrm>
+          <a:prstGeom prst="rect">
+            <a:avLst/>
+          </a:prstGeom>
+        </p:spPr>
+        <p:txBody>
+          <a:bodyPr/>
+          <a:lstStyle/>
+          <a:p>
+            <a:pPr/>
+            <a:r>
+              <a:t>Ryan Nesbitt</a:t>
+            </a:r>
+          </a:p>
+        </p:txBody>
+      </p:sp>
+      <p:sp>
+        <p:nvSpPr>
+          <p:cNvPr id="172" name="Strategic Reach vs Value"/>
+          <p:cNvSpPr txBox="1"/>
+          <p:nvPr/>
+        </p:nvSpPr>
+        <p:spPr>
+          <a:xfrm>
+            <a:off x="1206500" y="7357839"/>
+            <a:ext cx="21971000" cy="2006602"/>
+          </a:xfrm>
+          <a:prstGeom prst="rect">
+            <a:avLst/>
+          </a:prstGeom>
+          <a:ln w="12700">
+            <a:miter lim="400000"/>
+          </a:ln>
           <a:extLst>
             <a:ext uri="{C572A759-6A51-4108-AA02-DFA0A04FC94B}">
               <ma14:wrappingTextBoxFlag xmlns:ma14="http://schemas.microsoft.com/office/mac/drawingml/2011/main" val="1"/>
@@ -4262,32 +4558,21 @@
           </a:extLst>
         </p:spPr>
         <p:txBody>
-          <a:bodyPr/>
-          <a:lstStyle/>
-          <a:p>
-            <a:pPr/>
-            <a:r>
-              <a:t>Ryan Nesbitt</a:t>
-            </a:r>
-          </a:p>
-        </p:txBody>
-      </p:sp>
-      <p:sp>
-        <p:nvSpPr>
-          <p:cNvPr id="172" name="Strategic Reach vs Value"/>
-          <p:cNvSpPr txBox="1"/>
-          <p:nvPr>
-            <p:ph type="subTitle" sz="quarter" idx="1"/>
-          </p:nvPr>
-        </p:nvSpPr>
-        <p:spPr>
-          <a:prstGeom prst="rect">
-            <a:avLst/>
-          </a:prstGeom>
-        </p:spPr>
-        <p:txBody>
-          <a:bodyPr/>
-          <a:lstStyle/>
+          <a:bodyPr lIns="50800" tIns="50800" rIns="50800" bIns="50800">
+            <a:normAutofit fontScale="100000" lnSpcReduction="0"/>
+          </a:bodyPr>
+          <a:lstStyle>
+            <a:lvl1pPr defTabSz="825500">
+              <a:spcBef>
+                <a:spcPts val="0"/>
+              </a:spcBef>
+              <a:defRPr sz="5500">
+                <a:solidFill>
+                  <a:srgbClr val="FFFFFF"/>
+                </a:solidFill>
+              </a:defRPr>
+            </a:lvl1pPr>
+          </a:lstStyle>
           <a:p>
             <a:pPr/>
             <a:r>
@@ -4301,17 +4586,25 @@
           <p:cNvPr id="173" name="Market Position Analysis"/>
           <p:cNvSpPr txBox="1"/>
           <p:nvPr>
-            <p:ph type="ctrTitle"/>
+            <p:ph type="title"/>
           </p:nvPr>
         </p:nvSpPr>
         <p:spPr>
+          <a:xfrm>
+            <a:off x="1206500" y="2621718"/>
+            <a:ext cx="21971000" cy="4648203"/>
+          </a:xfrm>
           <a:prstGeom prst="rect">
             <a:avLst/>
           </a:prstGeom>
         </p:spPr>
         <p:txBody>
           <a:bodyPr/>
-          <a:lstStyle/>
+          <a:lstStyle>
+            <a:lvl1pPr>
+              <a:defRPr spc="-200"/>
+            </a:lvl1pPr>
+          </a:lstStyle>
           <a:p>
             <a:pPr/>
             <a:r>
@@ -4351,13 +4644,46 @@
           <p:cNvPr id="175" name="Ryan Nesbitt"/>
           <p:cNvSpPr txBox="1"/>
           <p:nvPr>
-            <p:ph type="body" idx="21"/>
+            <p:ph type="body" sz="quarter" idx="1"/>
           </p:nvPr>
         </p:nvSpPr>
         <p:spPr>
-          <a:prstGeom prst="rect">
-            <a:avLst/>
-          </a:prstGeom>
+          <a:xfrm>
+            <a:off x="1206500" y="12268782"/>
+            <a:ext cx="21971000" cy="660402"/>
+          </a:xfrm>
+          <a:prstGeom prst="rect">
+            <a:avLst/>
+          </a:prstGeom>
+        </p:spPr>
+        <p:txBody>
+          <a:bodyPr/>
+          <a:lstStyle/>
+          <a:p>
+            <a:pPr/>
+            <a:r>
+              <a:t>Ryan Nesbitt</a:t>
+            </a:r>
+          </a:p>
+        </p:txBody>
+      </p:sp>
+      <p:sp>
+        <p:nvSpPr>
+          <p:cNvPr id="176" name="What defines a top-performer?…"/>
+          <p:cNvSpPr txBox="1"/>
+          <p:nvPr/>
+        </p:nvSpPr>
+        <p:spPr>
+          <a:xfrm>
+            <a:off x="1206499" y="7357839"/>
+            <a:ext cx="21971002" cy="4388666"/>
+          </a:xfrm>
+          <a:prstGeom prst="rect">
+            <a:avLst/>
+          </a:prstGeom>
+          <a:ln w="12700">
+            <a:miter lim="400000"/>
+          </a:ln>
           <a:extLst>
             <a:ext uri="{C572A759-6A51-4108-AA02-DFA0A04FC94B}">
               <ma14:wrappingTextBoxFlag xmlns:ma14="http://schemas.microsoft.com/office/mac/drawingml/2011/main" val="1"/>
@@ -4365,47 +4691,48 @@
           </a:extLst>
         </p:spPr>
         <p:txBody>
-          <a:bodyPr/>
+          <a:bodyPr lIns="50800" tIns="50800" rIns="50800" bIns="50800">
+            <a:normAutofit fontScale="100000" lnSpcReduction="0"/>
+          </a:bodyPr>
           <a:lstStyle/>
           <a:p>
-            <a:pPr/>
-            <a:r>
-              <a:t>Ryan Nesbitt</a:t>
-            </a:r>
-          </a:p>
-        </p:txBody>
-      </p:sp>
-      <p:sp>
-        <p:nvSpPr>
-          <p:cNvPr id="176" name="What defines a top-performer?…"/>
-          <p:cNvSpPr txBox="1"/>
-          <p:nvPr>
-            <p:ph type="subTitle" sz="half" idx="1"/>
-          </p:nvPr>
-        </p:nvSpPr>
-        <p:spPr>
-          <a:xfrm>
-            <a:off x="1206499" y="7357839"/>
-            <a:ext cx="21971001" cy="4388665"/>
-          </a:xfrm>
-          <a:prstGeom prst="rect">
-            <a:avLst/>
-          </a:prstGeom>
-        </p:spPr>
-        <p:txBody>
-          <a:bodyPr/>
-          <a:lstStyle/>
-          <a:p>
-            <a:pPr algn="ctr"/>
-          </a:p>
-          <a:p>
-            <a:pPr algn="ctr"/>
+            <a:pPr algn="ctr" defTabSz="825500">
+              <a:spcBef>
+                <a:spcPts val="0"/>
+              </a:spcBef>
+              <a:defRPr sz="5500">
+                <a:solidFill>
+                  <a:srgbClr val="FFFFFF"/>
+                </a:solidFill>
+              </a:defRPr>
+            </a:pPr>
+          </a:p>
+          <a:p>
+            <a:pPr algn="ctr" defTabSz="825500">
+              <a:spcBef>
+                <a:spcPts val="0"/>
+              </a:spcBef>
+              <a:defRPr sz="5500">
+                <a:solidFill>
+                  <a:srgbClr val="FFFFFF"/>
+                </a:solidFill>
+              </a:defRPr>
+            </a:pPr>
             <a:r>
               <a:t>What defines a top-performer?</a:t>
             </a:r>
           </a:p>
           <a:p>
-            <a:pPr algn="ctr"/>
+            <a:pPr algn="ctr" defTabSz="825500">
+              <a:spcBef>
+                <a:spcPts val="0"/>
+              </a:spcBef>
+              <a:defRPr sz="5500">
+                <a:solidFill>
+                  <a:srgbClr val="FFFFFF"/>
+                </a:solidFill>
+              </a:defRPr>
+            </a:pPr>
             <a:r>
               <a:t>What are we missing?</a:t>
             </a:r>
@@ -4417,10 +4744,14 @@
           <p:cNvPr id="177" name="How Does Our Company Compare?"/>
           <p:cNvSpPr txBox="1"/>
           <p:nvPr>
-            <p:ph type="ctrTitle"/>
+            <p:ph type="title"/>
           </p:nvPr>
         </p:nvSpPr>
         <p:spPr>
+          <a:xfrm>
+            <a:off x="1206500" y="2621718"/>
+            <a:ext cx="21971000" cy="4648203"/>
+          </a:xfrm>
           <a:prstGeom prst="rect">
             <a:avLst/>
           </a:prstGeom>
@@ -4428,7 +4759,9 @@
         <p:txBody>
           <a:bodyPr/>
           <a:lstStyle>
-            <a:lvl1pPr algn="ctr"/>
+            <a:lvl1pPr algn="ctr">
+              <a:defRPr spc="-200"/>
+            </a:lvl1pPr>
           </a:lstStyle>
           <a:p>
             <a:pPr/>
@@ -4469,13 +4802,46 @@
           <p:cNvPr id="179" name="Ryan Nesbitt"/>
           <p:cNvSpPr txBox="1"/>
           <p:nvPr>
-            <p:ph type="body" idx="21"/>
+            <p:ph type="body" sz="quarter" idx="1"/>
           </p:nvPr>
         </p:nvSpPr>
         <p:spPr>
-          <a:prstGeom prst="rect">
-            <a:avLst/>
-          </a:prstGeom>
+          <a:xfrm>
+            <a:off x="1206500" y="12268782"/>
+            <a:ext cx="21971000" cy="660402"/>
+          </a:xfrm>
+          <a:prstGeom prst="rect">
+            <a:avLst/>
+          </a:prstGeom>
+        </p:spPr>
+        <p:txBody>
+          <a:bodyPr/>
+          <a:lstStyle/>
+          <a:p>
+            <a:pPr/>
+            <a:r>
+              <a:t>Ryan Nesbitt</a:t>
+            </a:r>
+          </a:p>
+        </p:txBody>
+      </p:sp>
+      <p:sp>
+        <p:nvSpPr>
+          <p:cNvPr id="180" name="Engineered and Normalized features…"/>
+          <p:cNvSpPr txBox="1"/>
+          <p:nvPr/>
+        </p:nvSpPr>
+        <p:spPr>
+          <a:xfrm>
+            <a:off x="1206499" y="7357839"/>
+            <a:ext cx="21971002" cy="4648202"/>
+          </a:xfrm>
+          <a:prstGeom prst="rect">
+            <a:avLst/>
+          </a:prstGeom>
+          <a:ln w="12700">
+            <a:miter lim="400000"/>
+          </a:ln>
           <a:extLst>
             <a:ext uri="{C572A759-6A51-4108-AA02-DFA0A04FC94B}">
               <ma14:wrappingTextBoxFlag xmlns:ma14="http://schemas.microsoft.com/office/mac/drawingml/2011/main" val="1"/>
@@ -4483,39 +4849,20 @@
           </a:extLst>
         </p:spPr>
         <p:txBody>
-          <a:bodyPr/>
+          <a:bodyPr lIns="50800" tIns="50800" rIns="50800" bIns="50800">
+            <a:normAutofit fontScale="100000" lnSpcReduction="0"/>
+          </a:bodyPr>
           <a:lstStyle/>
           <a:p>
-            <a:pPr/>
-            <a:r>
-              <a:t>Ryan Nesbitt</a:t>
-            </a:r>
-          </a:p>
-        </p:txBody>
-      </p:sp>
-      <p:sp>
-        <p:nvSpPr>
-          <p:cNvPr id="180" name="Engineered and Normalized features…"/>
-          <p:cNvSpPr txBox="1"/>
-          <p:nvPr>
-            <p:ph type="subTitle" sz="half" idx="1"/>
-          </p:nvPr>
-        </p:nvSpPr>
-        <p:spPr>
-          <a:xfrm>
-            <a:off x="1206499" y="7357839"/>
-            <a:ext cx="21971001" cy="4648201"/>
-          </a:xfrm>
-          <a:prstGeom prst="rect">
-            <a:avLst/>
-          </a:prstGeom>
-        </p:spPr>
-        <p:txBody>
-          <a:bodyPr/>
-          <a:lstStyle/>
-          <a:p>
             <a:pPr algn="ctr" defTabSz="808990">
-              <a:defRPr sz="5390"/>
+              <a:spcBef>
+                <a:spcPts val="0"/>
+              </a:spcBef>
+              <a:defRPr sz="5300">
+                <a:solidFill>
+                  <a:srgbClr val="FFFFFF"/>
+                </a:solidFill>
+              </a:defRPr>
             </a:pPr>
             <a:r>
               <a:t>Engineered and Normalized features</a:t>
@@ -4523,12 +4870,26 @@
           </a:p>
           <a:p>
             <a:pPr algn="ctr" defTabSz="808990">
-              <a:defRPr sz="5390"/>
+              <a:spcBef>
+                <a:spcPts val="0"/>
+              </a:spcBef>
+              <a:defRPr sz="5300">
+                <a:solidFill>
+                  <a:srgbClr val="FFFFFF"/>
+                </a:solidFill>
+              </a:defRPr>
             </a:pPr>
           </a:p>
           <a:p>
             <a:pPr algn="ctr" defTabSz="808990">
-              <a:defRPr sz="5390"/>
+              <a:spcBef>
+                <a:spcPts val="0"/>
+              </a:spcBef>
+              <a:defRPr sz="5300">
+                <a:solidFill>
+                  <a:srgbClr val="FFFFFF"/>
+                </a:solidFill>
+              </a:defRPr>
             </a:pPr>
             <a:r>
               <a:t>Two Dimensions:</a:t>
@@ -4536,7 +4897,14 @@
           </a:p>
           <a:p>
             <a:pPr algn="ctr" defTabSz="808990">
-              <a:defRPr sz="5390"/>
+              <a:spcBef>
+                <a:spcPts val="0"/>
+              </a:spcBef>
+              <a:defRPr sz="5300">
+                <a:solidFill>
+                  <a:srgbClr val="FFFFFF"/>
+                </a:solidFill>
+              </a:defRPr>
             </a:pPr>
             <a:r>
               <a:t>Quantity = Breadth = Reach</a:t>
@@ -4544,7 +4912,14 @@
           </a:p>
           <a:p>
             <a:pPr algn="ctr" defTabSz="808990">
-              <a:defRPr sz="5390"/>
+              <a:spcBef>
+                <a:spcPts val="0"/>
+              </a:spcBef>
+              <a:defRPr sz="5300">
+                <a:solidFill>
+                  <a:srgbClr val="FFFFFF"/>
+                </a:solidFill>
+              </a:defRPr>
             </a:pPr>
             <a:r>
               <a:t>Quality = Depth = Value</a:t>
@@ -4557,10 +4932,14 @@
           <p:cNvPr id="181" name="Mapping Dimensions Across 27 Companies"/>
           <p:cNvSpPr txBox="1"/>
           <p:nvPr>
-            <p:ph type="ctrTitle"/>
+            <p:ph type="title"/>
           </p:nvPr>
         </p:nvSpPr>
         <p:spPr>
+          <a:xfrm>
+            <a:off x="1206500" y="2621718"/>
+            <a:ext cx="21971000" cy="4648203"/>
+          </a:xfrm>
           <a:prstGeom prst="rect">
             <a:avLst/>
           </a:prstGeom>
@@ -4568,7 +4947,9 @@
         <p:txBody>
           <a:bodyPr/>
           <a:lstStyle>
-            <a:lvl1pPr algn="ctr"/>
+            <a:lvl1pPr algn="ctr">
+              <a:defRPr spc="-200"/>
+            </a:lvl1pPr>
           </a:lstStyle>
           <a:p>
             <a:pPr/>
@@ -4609,13 +4990,46 @@
           <p:cNvPr id="183" name="Ryan Nesbitt"/>
           <p:cNvSpPr txBox="1"/>
           <p:nvPr>
-            <p:ph type="body" idx="21"/>
+            <p:ph type="body" sz="quarter" idx="1"/>
           </p:nvPr>
         </p:nvSpPr>
         <p:spPr>
-          <a:prstGeom prst="rect">
-            <a:avLst/>
-          </a:prstGeom>
+          <a:xfrm>
+            <a:off x="1206500" y="12268782"/>
+            <a:ext cx="21971000" cy="660402"/>
+          </a:xfrm>
+          <a:prstGeom prst="rect">
+            <a:avLst/>
+          </a:prstGeom>
+        </p:spPr>
+        <p:txBody>
+          <a:bodyPr/>
+          <a:lstStyle/>
+          <a:p>
+            <a:pPr/>
+            <a:r>
+              <a:t>Ryan Nesbitt</a:t>
+            </a:r>
+          </a:p>
+        </p:txBody>
+      </p:sp>
+      <p:sp>
+        <p:nvSpPr>
+          <p:cNvPr id="184" name="Midfield positioning…"/>
+          <p:cNvSpPr txBox="1"/>
+          <p:nvPr/>
+        </p:nvSpPr>
+        <p:spPr>
+          <a:xfrm>
+            <a:off x="1362806" y="4497368"/>
+            <a:ext cx="7086970" cy="4721263"/>
+          </a:xfrm>
+          <a:prstGeom prst="rect">
+            <a:avLst/>
+          </a:prstGeom>
+          <a:ln w="12700">
+            <a:miter lim="400000"/>
+          </a:ln>
           <a:extLst>
             <a:ext uri="{C572A759-6A51-4108-AA02-DFA0A04FC94B}">
               <ma14:wrappingTextBoxFlag xmlns:ma14="http://schemas.microsoft.com/office/mac/drawingml/2011/main" val="1"/>
@@ -4623,50 +5037,60 @@
           </a:extLst>
         </p:spPr>
         <p:txBody>
-          <a:bodyPr/>
+          <a:bodyPr lIns="50800" tIns="50800" rIns="50800" bIns="50800">
+            <a:normAutofit fontScale="100000" lnSpcReduction="0"/>
+          </a:bodyPr>
           <a:lstStyle/>
           <a:p>
-            <a:pPr/>
-            <a:r>
-              <a:t>Ryan Nesbitt</a:t>
-            </a:r>
-          </a:p>
-        </p:txBody>
-      </p:sp>
-      <p:sp>
-        <p:nvSpPr>
-          <p:cNvPr id="184" name="Midfield positioning…"/>
-          <p:cNvSpPr txBox="1"/>
-          <p:nvPr>
-            <p:ph type="subTitle" sz="quarter" idx="1"/>
-          </p:nvPr>
-        </p:nvSpPr>
-        <p:spPr>
-          <a:xfrm>
-            <a:off x="1362807" y="4497369"/>
-            <a:ext cx="7086968" cy="4721262"/>
-          </a:xfrm>
-          <a:prstGeom prst="rect">
-            <a:avLst/>
-          </a:prstGeom>
-        </p:spPr>
-        <p:txBody>
-          <a:bodyPr/>
-          <a:lstStyle/>
-          <a:p>
-            <a:pPr algn="ctr"/>
-          </a:p>
-          <a:p>
-            <a:pPr algn="ctr"/>
+            <a:pPr algn="ctr" defTabSz="825500">
+              <a:spcBef>
+                <a:spcPts val="0"/>
+              </a:spcBef>
+              <a:defRPr sz="5500">
+                <a:solidFill>
+                  <a:srgbClr val="FFFFFF"/>
+                </a:solidFill>
+              </a:defRPr>
+            </a:pPr>
+          </a:p>
+          <a:p>
+            <a:pPr algn="ctr" defTabSz="825500">
+              <a:spcBef>
+                <a:spcPts val="0"/>
+              </a:spcBef>
+              <a:defRPr sz="5500">
+                <a:solidFill>
+                  <a:srgbClr val="FFFFFF"/>
+                </a:solidFill>
+              </a:defRPr>
+            </a:pPr>
             <a:r>
               <a:t>Midfield positioning</a:t>
             </a:r>
           </a:p>
           <a:p>
-            <a:pPr algn="ctr"/>
-          </a:p>
-          <a:p>
-            <a:pPr algn="ctr"/>
+            <a:pPr algn="ctr" defTabSz="825500">
+              <a:spcBef>
+                <a:spcPts val="0"/>
+              </a:spcBef>
+              <a:defRPr sz="5500">
+                <a:solidFill>
+                  <a:srgbClr val="FFFFFF"/>
+                </a:solidFill>
+              </a:defRPr>
+            </a:pPr>
+          </a:p>
+          <a:p>
+            <a:pPr algn="ctr" defTabSz="825500">
+              <a:spcBef>
+                <a:spcPts val="0"/>
+              </a:spcBef>
+              <a:defRPr sz="5500">
+                <a:solidFill>
+                  <a:srgbClr val="FFFFFF"/>
+                </a:solidFill>
+              </a:defRPr>
+            </a:pPr>
             <a:r>
               <a:t>Room to shift upward</a:t>
             </a:r>
@@ -4678,13 +5102,13 @@
           <p:cNvPr id="185" name="Market Position Analysis"/>
           <p:cNvSpPr txBox="1"/>
           <p:nvPr>
-            <p:ph type="ctrTitle"/>
+            <p:ph type="title"/>
           </p:nvPr>
         </p:nvSpPr>
         <p:spPr>
           <a:xfrm>
             <a:off x="1206499" y="155598"/>
-            <a:ext cx="21971001" cy="2164578"/>
+            <a:ext cx="21971002" cy="2164578"/>
           </a:xfrm>
           <a:prstGeom prst="rect">
             <a:avLst/>
@@ -4693,7 +5117,9 @@
         <p:txBody>
           <a:bodyPr/>
           <a:lstStyle>
-            <a:lvl1pPr algn="ctr"/>
+            <a:lvl1pPr algn="ctr">
+              <a:defRPr spc="-200"/>
+            </a:lvl1pPr>
           </a:lstStyle>
           <a:p>
             <a:pPr/>
@@ -4721,8 +5147,8 @@
         </p:blipFill>
         <p:spPr>
           <a:xfrm>
-            <a:off x="10305724" y="2877241"/>
-            <a:ext cx="13444449" cy="10083337"/>
+            <a:off x="10305723" y="2877241"/>
+            <a:ext cx="13444450" cy="10083338"/>
           </a:xfrm>
           <a:prstGeom prst="rect">
             <a:avLst/>
@@ -4763,13 +5189,46 @@
           <p:cNvPr id="188" name="Ryan Nesbitt"/>
           <p:cNvSpPr txBox="1"/>
           <p:nvPr>
-            <p:ph type="body" idx="21"/>
+            <p:ph type="body" sz="quarter" idx="1"/>
           </p:nvPr>
         </p:nvSpPr>
         <p:spPr>
-          <a:prstGeom prst="rect">
-            <a:avLst/>
-          </a:prstGeom>
+          <a:xfrm>
+            <a:off x="1206500" y="12268782"/>
+            <a:ext cx="21971000" cy="660402"/>
+          </a:xfrm>
+          <a:prstGeom prst="rect">
+            <a:avLst/>
+          </a:prstGeom>
+        </p:spPr>
+        <p:txBody>
+          <a:bodyPr/>
+          <a:lstStyle/>
+          <a:p>
+            <a:pPr/>
+            <a:r>
+              <a:t>Ryan Nesbitt</a:t>
+            </a:r>
+          </a:p>
+        </p:txBody>
+      </p:sp>
+      <p:sp>
+        <p:nvSpPr>
+          <p:cNvPr id="189" name="Reach &gt; Value…"/>
+          <p:cNvSpPr txBox="1"/>
+          <p:nvPr/>
+        </p:nvSpPr>
+        <p:spPr>
+          <a:xfrm>
+            <a:off x="372857" y="4497368"/>
+            <a:ext cx="7086970" cy="4721263"/>
+          </a:xfrm>
+          <a:prstGeom prst="rect">
+            <a:avLst/>
+          </a:prstGeom>
+          <a:ln w="12700">
+            <a:miter lim="400000"/>
+          </a:ln>
           <a:extLst>
             <a:ext uri="{C572A759-6A51-4108-AA02-DFA0A04FC94B}">
               <ma14:wrappingTextBoxFlag xmlns:ma14="http://schemas.microsoft.com/office/mac/drawingml/2011/main" val="1"/>
@@ -4777,50 +5236,60 @@
           </a:extLst>
         </p:spPr>
         <p:txBody>
-          <a:bodyPr/>
+          <a:bodyPr lIns="50800" tIns="50800" rIns="50800" bIns="50800">
+            <a:normAutofit fontScale="100000" lnSpcReduction="0"/>
+          </a:bodyPr>
           <a:lstStyle/>
           <a:p>
-            <a:pPr/>
-            <a:r>
-              <a:t>Ryan Nesbitt</a:t>
-            </a:r>
-          </a:p>
-        </p:txBody>
-      </p:sp>
-      <p:sp>
-        <p:nvSpPr>
-          <p:cNvPr id="189" name="Reach &gt; Value…"/>
-          <p:cNvSpPr txBox="1"/>
-          <p:nvPr>
-            <p:ph type="subTitle" sz="quarter" idx="1"/>
-          </p:nvPr>
-        </p:nvSpPr>
-        <p:spPr>
-          <a:xfrm>
-            <a:off x="372858" y="4497369"/>
-            <a:ext cx="7086968" cy="4721262"/>
-          </a:xfrm>
-          <a:prstGeom prst="rect">
-            <a:avLst/>
-          </a:prstGeom>
-        </p:spPr>
-        <p:txBody>
-          <a:bodyPr/>
-          <a:lstStyle/>
-          <a:p>
-            <a:pPr algn="ctr"/>
-          </a:p>
-          <a:p>
-            <a:pPr algn="ctr"/>
-            <a:r>
-              <a:t>Reach &gt; Value</a:t>
-            </a:r>
-          </a:p>
-          <a:p>
-            <a:pPr algn="ctr"/>
-          </a:p>
-          <a:p>
-            <a:pPr algn="ctr"/>
+            <a:pPr algn="ctr" defTabSz="825500">
+              <a:spcBef>
+                <a:spcPts val="0"/>
+              </a:spcBef>
+              <a:defRPr sz="5500">
+                <a:solidFill>
+                  <a:srgbClr val="FFFFFF"/>
+                </a:solidFill>
+              </a:defRPr>
+            </a:pPr>
+          </a:p>
+          <a:p>
+            <a:pPr algn="ctr" defTabSz="825500">
+              <a:spcBef>
+                <a:spcPts val="0"/>
+              </a:spcBef>
+              <a:defRPr sz="5500">
+                <a:solidFill>
+                  <a:srgbClr val="FFFFFF"/>
+                </a:solidFill>
+              </a:defRPr>
+            </a:pPr>
+            <a:r>
+              <a:t>Value &gt; Reach</a:t>
+            </a:r>
+          </a:p>
+          <a:p>
+            <a:pPr algn="ctr" defTabSz="825500">
+              <a:spcBef>
+                <a:spcPts val="0"/>
+              </a:spcBef>
+              <a:defRPr sz="5500">
+                <a:solidFill>
+                  <a:srgbClr val="FFFFFF"/>
+                </a:solidFill>
+              </a:defRPr>
+            </a:pPr>
+          </a:p>
+          <a:p>
+            <a:pPr algn="ctr" defTabSz="825500">
+              <a:spcBef>
+                <a:spcPts val="0"/>
+              </a:spcBef>
+              <a:defRPr sz="5500">
+                <a:solidFill>
+                  <a:srgbClr val="FFFFFF"/>
+                </a:solidFill>
+              </a:defRPr>
+            </a:pPr>
             <a:r>
               <a:t>Clear path forward</a:t>
             </a:r>
@@ -4832,7 +5301,7 @@
           <p:cNvPr id="190" name="Market Position Analysis"/>
           <p:cNvSpPr txBox="1"/>
           <p:nvPr>
-            <p:ph type="ctrTitle"/>
+            <p:ph type="title"/>
           </p:nvPr>
         </p:nvSpPr>
         <p:spPr>
@@ -4847,7 +5316,9 @@
         <p:txBody>
           <a:bodyPr/>
           <a:lstStyle>
-            <a:lvl1pPr algn="ctr"/>
+            <a:lvl1pPr algn="ctr">
+              <a:defRPr spc="-200"/>
+            </a:lvl1pPr>
           </a:lstStyle>
           <a:p>
             <a:pPr/>
@@ -4869,15 +5340,14 @@
           <a:blip r:embed="rId2">
             <a:extLst/>
           </a:blip>
-          <a:srcRect l="0" t="0" r="0" b="0"/>
           <a:stretch>
             <a:fillRect/>
           </a:stretch>
         </p:blipFill>
         <p:spPr>
           <a:xfrm>
-            <a:off x="8169519" y="3684195"/>
-            <a:ext cx="15589646" cy="9353789"/>
+            <a:off x="8169519" y="3684194"/>
+            <a:ext cx="15589646" cy="9353790"/>
           </a:xfrm>
           <a:prstGeom prst="rect">
             <a:avLst/>
@@ -4918,13 +5388,46 @@
           <p:cNvPr id="193" name="Ryan Nesbitt"/>
           <p:cNvSpPr txBox="1"/>
           <p:nvPr>
-            <p:ph type="body" idx="21"/>
+            <p:ph type="body" sz="quarter" idx="1"/>
           </p:nvPr>
         </p:nvSpPr>
         <p:spPr>
-          <a:prstGeom prst="rect">
-            <a:avLst/>
-          </a:prstGeom>
+          <a:xfrm>
+            <a:off x="1206500" y="12268782"/>
+            <a:ext cx="21971000" cy="660402"/>
+          </a:xfrm>
+          <a:prstGeom prst="rect">
+            <a:avLst/>
+          </a:prstGeom>
+        </p:spPr>
+        <p:txBody>
+          <a:bodyPr/>
+          <a:lstStyle/>
+          <a:p>
+            <a:pPr/>
+            <a:r>
+              <a:t>Ryan Nesbitt</a:t>
+            </a:r>
+          </a:p>
+        </p:txBody>
+      </p:sp>
+      <p:sp>
+        <p:nvSpPr>
+          <p:cNvPr id="194" name="Strong operational scale (high Reach)…"/>
+          <p:cNvSpPr txBox="1"/>
+          <p:nvPr/>
+        </p:nvSpPr>
+        <p:spPr>
+          <a:xfrm>
+            <a:off x="1206499" y="7357839"/>
+            <a:ext cx="21971002" cy="4823024"/>
+          </a:xfrm>
+          <a:prstGeom prst="rect">
+            <a:avLst/>
+          </a:prstGeom>
+          <a:ln w="12700">
+            <a:miter lim="400000"/>
+          </a:ln>
           <a:extLst>
             <a:ext uri="{C572A759-6A51-4108-AA02-DFA0A04FC94B}">
               <ma14:wrappingTextBoxFlag xmlns:ma14="http://schemas.microsoft.com/office/mac/drawingml/2011/main" val="1"/>
@@ -4932,52 +5435,62 @@
           </a:extLst>
         </p:spPr>
         <p:txBody>
-          <a:bodyPr/>
+          <a:bodyPr lIns="50800" tIns="50800" rIns="50800" bIns="50800">
+            <a:normAutofit fontScale="100000" lnSpcReduction="0"/>
+          </a:bodyPr>
           <a:lstStyle/>
           <a:p>
-            <a:pPr/>
-            <a:r>
-              <a:t>Ryan Nesbitt</a:t>
-            </a:r>
-          </a:p>
-        </p:txBody>
-      </p:sp>
-      <p:sp>
-        <p:nvSpPr>
-          <p:cNvPr id="194" name="Strong operational scale (high Reach)…"/>
-          <p:cNvSpPr txBox="1"/>
-          <p:nvPr>
-            <p:ph type="subTitle" sz="half" idx="1"/>
-          </p:nvPr>
-        </p:nvSpPr>
-        <p:spPr>
-          <a:xfrm>
-            <a:off x="1206499" y="7357839"/>
-            <a:ext cx="21971001" cy="4823024"/>
-          </a:xfrm>
-          <a:prstGeom prst="rect">
-            <a:avLst/>
-          </a:prstGeom>
-        </p:spPr>
-        <p:txBody>
-          <a:bodyPr/>
-          <a:lstStyle/>
-          <a:p>
-            <a:pPr algn="ctr"/>
-          </a:p>
-          <a:p>
-            <a:pPr algn="ctr"/>
-            <a:r>
-              <a:t>Strong operational scale (high Reach)</a:t>
-            </a:r>
-          </a:p>
-          <a:p>
-            <a:pPr algn="ctr"/>
-          </a:p>
-          <a:p>
-            <a:pPr algn="ctr"/>
-            <a:r>
-              <a:t>Underperforming perception (low Value)</a:t>
+            <a:pPr algn="ctr" defTabSz="825500">
+              <a:spcBef>
+                <a:spcPts val="0"/>
+              </a:spcBef>
+              <a:defRPr sz="5500">
+                <a:solidFill>
+                  <a:srgbClr val="FFFFFF"/>
+                </a:solidFill>
+              </a:defRPr>
+            </a:pPr>
+          </a:p>
+          <a:p>
+            <a:pPr algn="ctr" defTabSz="825500">
+              <a:spcBef>
+                <a:spcPts val="0"/>
+              </a:spcBef>
+              <a:defRPr sz="5500">
+                <a:solidFill>
+                  <a:srgbClr val="FFFFFF"/>
+                </a:solidFill>
+              </a:defRPr>
+            </a:pPr>
+            <a:r>
+              <a:t>Strong perception (high Value)</a:t>
+            </a:r>
+          </a:p>
+          <a:p>
+            <a:pPr algn="ctr" defTabSz="825500">
+              <a:spcBef>
+                <a:spcPts val="0"/>
+              </a:spcBef>
+              <a:defRPr sz="5500">
+                <a:solidFill>
+                  <a:srgbClr val="FFFFFF"/>
+                </a:solidFill>
+              </a:defRPr>
+            </a:pPr>
+          </a:p>
+          <a:p>
+            <a:pPr algn="ctr" defTabSz="825500">
+              <a:spcBef>
+                <a:spcPts val="0"/>
+              </a:spcBef>
+              <a:defRPr sz="5500">
+                <a:solidFill>
+                  <a:srgbClr val="FFFFFF"/>
+                </a:solidFill>
+              </a:defRPr>
+            </a:pPr>
+            <a:r>
+              <a:t>Limited operational scale (low Reach)</a:t>
             </a:r>
           </a:p>
         </p:txBody>
@@ -4987,10 +5500,14 @@
           <p:cNvPr id="195" name="What Does This Tell Us?"/>
           <p:cNvSpPr txBox="1"/>
           <p:nvPr>
-            <p:ph type="ctrTitle"/>
+            <p:ph type="title"/>
           </p:nvPr>
         </p:nvSpPr>
         <p:spPr>
+          <a:xfrm>
+            <a:off x="1206500" y="2621718"/>
+            <a:ext cx="21971000" cy="4648203"/>
+          </a:xfrm>
           <a:prstGeom prst="rect">
             <a:avLst/>
           </a:prstGeom>
@@ -4998,7 +5515,9 @@
         <p:txBody>
           <a:bodyPr/>
           <a:lstStyle>
-            <a:lvl1pPr algn="ctr"/>
+            <a:lvl1pPr algn="ctr">
+              <a:defRPr spc="-200"/>
+            </a:lvl1pPr>
           </a:lstStyle>
           <a:p>
             <a:pPr/>
@@ -5039,13 +5558,46 @@
           <p:cNvPr id="197" name="Ryan Nesbitt"/>
           <p:cNvSpPr txBox="1"/>
           <p:nvPr>
-            <p:ph type="body" idx="21"/>
+            <p:ph type="body" sz="quarter" idx="1"/>
           </p:nvPr>
         </p:nvSpPr>
         <p:spPr>
-          <a:prstGeom prst="rect">
-            <a:avLst/>
-          </a:prstGeom>
+          <a:xfrm>
+            <a:off x="1206500" y="12268782"/>
+            <a:ext cx="21971000" cy="660402"/>
+          </a:xfrm>
+          <a:prstGeom prst="rect">
+            <a:avLst/>
+          </a:prstGeom>
+        </p:spPr>
+        <p:txBody>
+          <a:bodyPr/>
+          <a:lstStyle/>
+          <a:p>
+            <a:pPr/>
+            <a:r>
+              <a:t>Ryan Nesbitt</a:t>
+            </a:r>
+          </a:p>
+        </p:txBody>
+      </p:sp>
+      <p:sp>
+        <p:nvSpPr>
+          <p:cNvPr id="198" name="Resource distribution:…"/>
+          <p:cNvSpPr txBox="1"/>
+          <p:nvPr/>
+        </p:nvSpPr>
+        <p:spPr>
+          <a:xfrm>
+            <a:off x="1206499" y="3458712"/>
+            <a:ext cx="21971002" cy="8296766"/>
+          </a:xfrm>
+          <a:prstGeom prst="rect">
+            <a:avLst/>
+          </a:prstGeom>
+          <a:ln w="12700">
+            <a:miter lim="400000"/>
+          </a:ln>
           <a:extLst>
             <a:ext uri="{C572A759-6A51-4108-AA02-DFA0A04FC94B}">
               <ma14:wrappingTextBoxFlag xmlns:ma14="http://schemas.microsoft.com/office/mac/drawingml/2011/main" val="1"/>
@@ -5053,100 +5605,152 @@
           </a:extLst>
         </p:spPr>
         <p:txBody>
-          <a:bodyPr/>
+          <a:bodyPr lIns="50800" tIns="50800" rIns="50800" bIns="50800">
+            <a:normAutofit fontScale="100000" lnSpcReduction="0"/>
+          </a:bodyPr>
           <a:lstStyle/>
           <a:p>
-            <a:pPr/>
-            <a:r>
-              <a:t>Ryan Nesbitt</a:t>
-            </a:r>
-          </a:p>
-        </p:txBody>
-      </p:sp>
-      <p:sp>
-        <p:nvSpPr>
-          <p:cNvPr id="198" name="Resource distribution:…"/>
-          <p:cNvSpPr txBox="1"/>
-          <p:nvPr>
-            <p:ph type="subTitle" idx="1"/>
-          </p:nvPr>
-        </p:nvSpPr>
-        <p:spPr>
-          <a:xfrm>
-            <a:off x="1206499" y="3458712"/>
-            <a:ext cx="21971001" cy="8296766"/>
-          </a:xfrm>
-          <a:prstGeom prst="rect">
-            <a:avLst/>
-          </a:prstGeom>
-        </p:spPr>
-        <p:txBody>
-          <a:bodyPr/>
-          <a:lstStyle/>
-          <a:p>
-            <a:pPr algn="ctr" defTabSz="808990">
-              <a:defRPr sz="5390"/>
+            <a:pPr algn="ctr" defTabSz="752360">
+              <a:spcBef>
+                <a:spcPts val="0"/>
+              </a:spcBef>
+              <a:defRPr sz="4929">
+                <a:solidFill>
+                  <a:srgbClr val="FFFFFF"/>
+                </a:solidFill>
+              </a:defRPr>
             </a:pPr>
             <a:r>
               <a:t>Resource distribution:</a:t>
             </a:r>
           </a:p>
           <a:p>
-            <a:pPr algn="ctr" defTabSz="808990">
-              <a:defRPr sz="5390"/>
+            <a:pPr algn="ctr" defTabSz="752360">
+              <a:spcBef>
+                <a:spcPts val="0"/>
+              </a:spcBef>
+              <a:defRPr sz="4929">
+                <a:solidFill>
+                  <a:srgbClr val="FFFFFF"/>
+                </a:solidFill>
+              </a:defRPr>
             </a:pPr>
             <a:r>
-              <a:t>30% Reach</a:t>
-            </a:r>
-          </a:p>
-          <a:p>
-            <a:pPr algn="ctr" defTabSz="808990">
-              <a:defRPr sz="5390"/>
+              <a:t>30% Value</a:t>
+            </a:r>
+          </a:p>
+          <a:p>
+            <a:pPr algn="ctr" defTabSz="752360">
+              <a:spcBef>
+                <a:spcPts val="0"/>
+              </a:spcBef>
+              <a:defRPr sz="4929">
+                <a:solidFill>
+                  <a:srgbClr val="FFFFFF"/>
+                </a:solidFill>
+              </a:defRPr>
             </a:pPr>
             <a:r>
-              <a:t>70% Value</a:t>
-            </a:r>
-          </a:p>
-          <a:p>
-            <a:pPr algn="ctr" defTabSz="808990">
-              <a:defRPr sz="5390"/>
+              <a:t>70% Reach</a:t>
+            </a:r>
+          </a:p>
+          <a:p>
+            <a:pPr algn="ctr" defTabSz="752360">
+              <a:spcBef>
+                <a:spcPts val="0"/>
+              </a:spcBef>
+              <a:defRPr sz="4929">
+                <a:solidFill>
+                  <a:srgbClr val="FFFFFF"/>
+                </a:solidFill>
+              </a:defRPr>
             </a:pPr>
           </a:p>
           <a:p>
-            <a:pPr algn="ctr" defTabSz="808990">
-              <a:defRPr sz="5390"/>
+            <a:pPr algn="ctr" defTabSz="752360">
+              <a:spcBef>
+                <a:spcPts val="0"/>
+              </a:spcBef>
+              <a:defRPr sz="4929">
+                <a:solidFill>
+                  <a:srgbClr val="FFFFFF"/>
+                </a:solidFill>
+              </a:defRPr>
             </a:pPr>
             <a:r>
               <a:t>Focus areas:</a:t>
             </a:r>
           </a:p>
           <a:p>
-            <a:pPr algn="ctr" defTabSz="808990">
-              <a:defRPr sz="5390"/>
+            <a:pPr algn="ctr" defTabSz="752360">
+              <a:spcBef>
+                <a:spcPts val="0"/>
+              </a:spcBef>
+              <a:defRPr sz="4929">
+                <a:solidFill>
+                  <a:srgbClr val="FFFFFF"/>
+                </a:solidFill>
+              </a:defRPr>
             </a:pPr>
             <a:r>
-              <a:t>Satisfaction (CX)</a:t>
-            </a:r>
-          </a:p>
-          <a:p>
-            <a:pPr algn="ctr" defTabSz="808990">
-              <a:defRPr sz="5390"/>
+              <a:t>Global Presence</a:t>
+            </a:r>
+          </a:p>
+          <a:p>
+            <a:pPr algn="ctr" defTabSz="752360">
+              <a:spcBef>
+                <a:spcPts val="0"/>
+              </a:spcBef>
+              <a:defRPr sz="4929">
+                <a:solidFill>
+                  <a:srgbClr val="FFFFFF"/>
+                </a:solidFill>
+              </a:defRPr>
             </a:pPr>
             <a:r>
-              <a:t>Loyalty (NPS)</a:t>
-            </a:r>
-          </a:p>
-          <a:p>
-            <a:pPr algn="ctr" defTabSz="808990">
-              <a:defRPr sz="5390"/>
+              <a:t>Brand Buzz</a:t>
+            </a:r>
+          </a:p>
+          <a:p>
+            <a:pPr algn="ctr" defTabSz="752360">
+              <a:spcBef>
+                <a:spcPts val="0"/>
+              </a:spcBef>
+              <a:defRPr sz="4929">
+                <a:solidFill>
+                  <a:srgbClr val="FFFFFF"/>
+                </a:solidFill>
+              </a:defRPr>
             </a:pPr>
-          </a:p>
-          <a:p>
-            <a:pPr algn="ctr" defTabSz="808990">
-              <a:defRPr sz="5390"/>
+            <a:r>
+              <a:t>Product Count</a:t>
+            </a:r>
+          </a:p>
+          <a:p>
+            <a:pPr algn="ctr" defTabSz="752360">
+              <a:spcBef>
+                <a:spcPts val="0"/>
+              </a:spcBef>
+              <a:defRPr sz="4929">
+                <a:solidFill>
+                  <a:srgbClr val="FFFFFF"/>
+                </a:solidFill>
+              </a:defRPr>
             </a:pPr>
-            <a:r>
-              <a:t>Elevate Value to match Reach = Top 3</a:t>
+          </a:p>
+          <a:p>
+            <a:pPr algn="ctr" defTabSz="752360">
+              <a:spcBef>
+                <a:spcPts val="0"/>
+              </a:spcBef>
+              <a:defRPr sz="4929">
+                <a:solidFill>
+                  <a:srgbClr val="FFFFFF"/>
+                </a:solidFill>
+              </a:defRPr>
+            </a:pPr>
+            <a:r>
+              <a:t>Elevate Reach to match Value = Top 5 Positioning</a:t>
             </a:r>
           </a:p>
         </p:txBody>
@@ -5156,13 +5760,13 @@
           <p:cNvPr id="199" name="Recommendation"/>
           <p:cNvSpPr txBox="1"/>
           <p:nvPr>
-            <p:ph type="ctrTitle"/>
+            <p:ph type="title"/>
           </p:nvPr>
         </p:nvSpPr>
         <p:spPr>
           <a:xfrm>
-            <a:off x="1206500" y="803624"/>
-            <a:ext cx="21971001" cy="2141783"/>
+            <a:off x="1206500" y="803623"/>
+            <a:ext cx="21971002" cy="2141785"/>
           </a:xfrm>
           <a:prstGeom prst="rect">
             <a:avLst/>
@@ -5171,7 +5775,9 @@
         <p:txBody>
           <a:bodyPr/>
           <a:lstStyle>
-            <a:lvl1pPr algn="ctr"/>
+            <a:lvl1pPr algn="ctr">
+              <a:defRPr spc="-200"/>
+            </a:lvl1pPr>
           </a:lstStyle>
           <a:p>
             <a:pPr/>
@@ -5198,13 +5804,13 @@
         <a:srgbClr val="4B6079"/>
       </a:dk1>
       <a:lt1>
-        <a:srgbClr val="FFFFFF"/>
+        <a:srgbClr val="4B6079"/>
       </a:lt1>
       <a:dk2>
-        <a:srgbClr val="6F6F6F"/>
+        <a:srgbClr val="A7A7A7"/>
       </a:dk2>
       <a:lt2>
-        <a:srgbClr val="D5D5D5"/>
+        <a:srgbClr val="535353"/>
       </a:lt2>
       <a:accent1>
         <a:srgbClr val="9BAABB"/>
@@ -5233,14 +5839,14 @@
     </a:clrScheme>
     <a:fontScheme name="37_MinimalistDark">
       <a:majorFont>
-        <a:latin typeface="Produkt Extralight"/>
-        <a:ea typeface="Produkt Extralight"/>
-        <a:cs typeface="Produkt Extralight"/>
+        <a:latin typeface="Helvetica"/>
+        <a:ea typeface="Helvetica"/>
+        <a:cs typeface="Helvetica"/>
       </a:majorFont>
       <a:minorFont>
-        <a:latin typeface="Produkt Extralight"/>
-        <a:ea typeface="Produkt Extralight"/>
-        <a:cs typeface="Produkt Extralight"/>
+        <a:latin typeface="Helvetica Neue"/>
+        <a:ea typeface="Helvetica Neue"/>
+        <a:cs typeface="Helvetica Neue"/>
       </a:minorFont>
     </a:fontScheme>
     <a:fmtScheme name="37_MinimalistDark">
@@ -5383,9 +5989,12 @@
         <a:solidFill>
           <a:srgbClr val="FFFFFF"/>
         </a:solidFill>
-        <a:ln w="12700" cap="flat">
-          <a:noFill/>
-          <a:miter lim="400000"/>
+        <a:ln w="25400" cap="flat">
+          <a:solidFill>
+            <a:schemeClr val="accent1"/>
+          </a:solidFill>
+          <a:prstDash val="solid"/>
+          <a:round/>
         </a:ln>
         <a:effectLst/>
         <a:sp3d/>
@@ -5394,12 +6003,12 @@
         <a:spAutoFit/>
       </a:bodyPr>
       <a:lstStyle>
-        <a:defPPr marL="0" marR="0" indent="0" algn="ctr" defTabSz="825500" rtl="0" fontAlgn="auto" latinLnBrk="0" hangingPunct="0">
+        <a:defPPr marL="0" marR="0" indent="0" algn="l" defTabSz="2438337" rtl="0" fontAlgn="auto" latinLnBrk="0" hangingPunct="0">
           <a:lnSpc>
             <a:spcPct val="100000"/>
           </a:lnSpc>
           <a:spcBef>
-            <a:spcPts val="0"/>
+            <a:spcPts val="4700"/>
           </a:spcBef>
           <a:spcAft>
             <a:spcPts val="0"/>
@@ -5409,22 +6018,19 @@
           <a:buFontTx/>
           <a:buNone/>
           <a:tabLst/>
-          <a:defRPr b="0" baseline="0" cap="none" i="0" spc="0" strike="noStrike" sz="3200" u="none" kumimoji="0" normalizeH="0">
+          <a:defRPr b="0" baseline="0" cap="none" i="0" spc="0" strike="noStrike" sz="4000" u="none" kumimoji="0" normalizeH="0">
             <a:ln>
               <a:noFill/>
             </a:ln>
             <a:solidFill>
-              <a:schemeClr val="accent1">
-                <a:satOff val="5092"/>
-                <a:lumOff val="-28652"/>
-              </a:schemeClr>
+              <a:srgbClr val="4B6079"/>
             </a:solidFill>
             <a:effectLst/>
             <a:uFillTx/>
-            <a:latin typeface="Graphik Light"/>
-            <a:ea typeface="Graphik Light"/>
-            <a:cs typeface="Graphik Light"/>
-            <a:sym typeface="Graphik Light"/>
+            <a:latin typeface="Produkt Extralight"/>
+            <a:ea typeface="Produkt Extralight"/>
+            <a:cs typeface="Produkt Extralight"/>
+            <a:sym typeface="Produkt Extralight"/>
           </a:defRPr>
         </a:defPPr>
         <a:lvl1pPr marL="0" marR="0" indent="0" algn="l" defTabSz="914400" rtl="0" fontAlgn="auto" latinLnBrk="1" hangingPunct="0">
@@ -5674,10 +6280,10 @@
         <a:noFill/>
         <a:ln w="25400" cap="flat">
           <a:solidFill>
-            <a:srgbClr val="FFFFFF"/>
+            <a:schemeClr val="accent1"/>
           </a:solidFill>
           <a:prstDash val="solid"/>
-          <a:miter lim="400000"/>
+          <a:round/>
         </a:ln>
         <a:effectLst/>
         <a:sp3d/>
@@ -5968,7 +6574,7 @@
         <a:spAutoFit/>
       </a:bodyPr>
       <a:lstStyle>
-        <a:defPPr marL="0" marR="0" indent="0" algn="l" defTabSz="2438338" rtl="0" fontAlgn="auto" latinLnBrk="0" hangingPunct="0">
+        <a:defPPr marL="0" marR="0" indent="0" algn="l" defTabSz="2438337" rtl="0" fontAlgn="auto" latinLnBrk="0" hangingPunct="0">
           <a:lnSpc>
             <a:spcPct val="100000"/>
           </a:lnSpc>
@@ -5988,14 +6594,14 @@
               <a:noFill/>
             </a:ln>
             <a:solidFill>
-              <a:srgbClr val="FFFFFF"/>
+              <a:srgbClr val="4B6079"/>
             </a:solidFill>
             <a:effectLst/>
             <a:uFillTx/>
-            <a:latin typeface="Graphik Light"/>
-            <a:ea typeface="Graphik Light"/>
-            <a:cs typeface="Graphik Light"/>
-            <a:sym typeface="Graphik Light"/>
+            <a:latin typeface="Produkt Extralight"/>
+            <a:ea typeface="Produkt Extralight"/>
+            <a:cs typeface="Produkt Extralight"/>
+            <a:sym typeface="Produkt Extralight"/>
           </a:defRPr>
         </a:defPPr>
         <a:lvl1pPr marL="0" marR="0" indent="0" algn="l" defTabSz="914400" rtl="0" fontAlgn="auto" latinLnBrk="1" hangingPunct="0">
@@ -6255,10 +6861,10 @@
         <a:srgbClr val="FFFFFF"/>
       </a:lt1>
       <a:dk2>
-        <a:srgbClr val="6F6F6F"/>
+        <a:srgbClr val="A7A7A7"/>
       </a:dk2>
       <a:lt2>
-        <a:srgbClr val="D5D5D5"/>
+        <a:srgbClr val="535353"/>
       </a:lt2>
       <a:accent1>
         <a:srgbClr val="9BAABB"/>
@@ -6287,14 +6893,14 @@
     </a:clrScheme>
     <a:fontScheme name="37_MinimalistDark">
       <a:majorFont>
-        <a:latin typeface="Produkt Extralight"/>
-        <a:ea typeface="Produkt Extralight"/>
-        <a:cs typeface="Produkt Extralight"/>
+        <a:latin typeface="Helvetica"/>
+        <a:ea typeface="Helvetica"/>
+        <a:cs typeface="Helvetica"/>
       </a:majorFont>
       <a:minorFont>
-        <a:latin typeface="Produkt Extralight"/>
-        <a:ea typeface="Produkt Extralight"/>
-        <a:cs typeface="Produkt Extralight"/>
+        <a:latin typeface="Helvetica Neue"/>
+        <a:ea typeface="Helvetica Neue"/>
+        <a:cs typeface="Helvetica Neue"/>
       </a:minorFont>
     </a:fontScheme>
     <a:fmtScheme name="37_MinimalistDark">
@@ -6437,9 +7043,12 @@
         <a:solidFill>
           <a:srgbClr val="FFFFFF"/>
         </a:solidFill>
-        <a:ln w="12700" cap="flat">
-          <a:noFill/>
-          <a:miter lim="400000"/>
+        <a:ln w="25400" cap="flat">
+          <a:solidFill>
+            <a:schemeClr val="accent1"/>
+          </a:solidFill>
+          <a:prstDash val="solid"/>
+          <a:round/>
         </a:ln>
         <a:effectLst/>
         <a:sp3d/>
@@ -6448,12 +7057,12 @@
         <a:spAutoFit/>
       </a:bodyPr>
       <a:lstStyle>
-        <a:defPPr marL="0" marR="0" indent="0" algn="ctr" defTabSz="825500" rtl="0" fontAlgn="auto" latinLnBrk="0" hangingPunct="0">
+        <a:defPPr marL="0" marR="0" indent="0" algn="l" defTabSz="2438337" rtl="0" fontAlgn="auto" latinLnBrk="0" hangingPunct="0">
           <a:lnSpc>
             <a:spcPct val="100000"/>
           </a:lnSpc>
           <a:spcBef>
-            <a:spcPts val="0"/>
+            <a:spcPts val="4700"/>
           </a:spcBef>
           <a:spcAft>
             <a:spcPts val="0"/>
@@ -6463,22 +7072,19 @@
           <a:buFontTx/>
           <a:buNone/>
           <a:tabLst/>
-          <a:defRPr b="0" baseline="0" cap="none" i="0" spc="0" strike="noStrike" sz="3200" u="none" kumimoji="0" normalizeH="0">
+          <a:defRPr b="0" baseline="0" cap="none" i="0" spc="0" strike="noStrike" sz="4000" u="none" kumimoji="0" normalizeH="0">
             <a:ln>
               <a:noFill/>
             </a:ln>
             <a:solidFill>
-              <a:schemeClr val="accent1">
-                <a:satOff val="5092"/>
-                <a:lumOff val="-28652"/>
-              </a:schemeClr>
+              <a:srgbClr val="4B6079"/>
             </a:solidFill>
             <a:effectLst/>
             <a:uFillTx/>
-            <a:latin typeface="Graphik Light"/>
-            <a:ea typeface="Graphik Light"/>
-            <a:cs typeface="Graphik Light"/>
-            <a:sym typeface="Graphik Light"/>
+            <a:latin typeface="Produkt Extralight"/>
+            <a:ea typeface="Produkt Extralight"/>
+            <a:cs typeface="Produkt Extralight"/>
+            <a:sym typeface="Produkt Extralight"/>
           </a:defRPr>
         </a:defPPr>
         <a:lvl1pPr marL="0" marR="0" indent="0" algn="l" defTabSz="914400" rtl="0" fontAlgn="auto" latinLnBrk="1" hangingPunct="0">
@@ -6728,10 +7334,10 @@
         <a:noFill/>
         <a:ln w="25400" cap="flat">
           <a:solidFill>
-            <a:srgbClr val="FFFFFF"/>
+            <a:schemeClr val="accent1"/>
           </a:solidFill>
           <a:prstDash val="solid"/>
-          <a:miter lim="400000"/>
+          <a:round/>
         </a:ln>
         <a:effectLst/>
         <a:sp3d/>
@@ -7022,7 +7628,7 @@
         <a:spAutoFit/>
       </a:bodyPr>
       <a:lstStyle>
-        <a:defPPr marL="0" marR="0" indent="0" algn="l" defTabSz="2438338" rtl="0" fontAlgn="auto" latinLnBrk="0" hangingPunct="0">
+        <a:defPPr marL="0" marR="0" indent="0" algn="l" defTabSz="2438337" rtl="0" fontAlgn="auto" latinLnBrk="0" hangingPunct="0">
           <a:lnSpc>
             <a:spcPct val="100000"/>
           </a:lnSpc>
@@ -7042,14 +7648,14 @@
               <a:noFill/>
             </a:ln>
             <a:solidFill>
-              <a:srgbClr val="FFFFFF"/>
+              <a:srgbClr val="4B6079"/>
             </a:solidFill>
             <a:effectLst/>
             <a:uFillTx/>
-            <a:latin typeface="Graphik Light"/>
-            <a:ea typeface="Graphik Light"/>
-            <a:cs typeface="Graphik Light"/>
-            <a:sym typeface="Graphik Light"/>
+            <a:latin typeface="Produkt Extralight"/>
+            <a:ea typeface="Produkt Extralight"/>
+            <a:cs typeface="Produkt Extralight"/>
+            <a:sym typeface="Produkt Extralight"/>
           </a:defRPr>
         </a:defPPr>
         <a:lvl1pPr marL="0" marR="0" indent="0" algn="l" defTabSz="914400" rtl="0" fontAlgn="auto" latinLnBrk="1" hangingPunct="0">

</xml_diff>